<commit_message>
Final draft of presentation
</commit_message>
<xml_diff>
--- a/PST4 Genetic Algorithms.pptx
+++ b/PST4 Genetic Algorithms.pptx
@@ -5,22 +5,25 @@
     <p:sldMasterId id="2147483648" r:id="rId1"/>
   </p:sldMasterIdLst>
   <p:notesMasterIdLst>
-    <p:notesMasterId r:id="rId12"/>
+    <p:notesMasterId r:id="rId15"/>
   </p:notesMasterIdLst>
   <p:handoutMasterIdLst>
-    <p:handoutMasterId r:id="rId13"/>
+    <p:handoutMasterId r:id="rId16"/>
   </p:handoutMasterIdLst>
   <p:sldIdLst>
     <p:sldId id="258" r:id="rId2"/>
     <p:sldId id="260" r:id="rId3"/>
     <p:sldId id="262" r:id="rId4"/>
     <p:sldId id="270" r:id="rId5"/>
-    <p:sldId id="263" r:id="rId6"/>
-    <p:sldId id="272" r:id="rId7"/>
+    <p:sldId id="272" r:id="rId6"/>
+    <p:sldId id="263" r:id="rId7"/>
     <p:sldId id="265" r:id="rId8"/>
     <p:sldId id="266" r:id="rId9"/>
-    <p:sldId id="271" r:id="rId10"/>
-    <p:sldId id="268" r:id="rId11"/>
+    <p:sldId id="274" r:id="rId10"/>
+    <p:sldId id="273" r:id="rId11"/>
+    <p:sldId id="271" r:id="rId12"/>
+    <p:sldId id="275" r:id="rId13"/>
+    <p:sldId id="268" r:id="rId14"/>
   </p:sldIdLst>
   <p:sldSz cx="12192000" cy="6858000"/>
   <p:notesSz cx="6858000" cy="9144000"/>
@@ -900,7 +903,7 @@
         <a:p>
           <a:r>
             <a:rPr lang="en-US" dirty="0" smtClean="0"/>
-            <a:t>Set up data genomes</a:t>
+            <a:t>Prepare and setup GA</a:t>
           </a:r>
           <a:endParaRPr lang="en-US" dirty="0"/>
         </a:p>
@@ -936,9 +939,37 @@
         <a:lstStyle/>
         <a:p>
           <a:r>
-            <a:rPr lang="en-US" dirty="0"/>
-            <a:t>Task description</a:t>
+            <a:rPr lang="en-US" dirty="0" smtClean="0"/>
+            <a:t>Map categorical features
+</a:t>
           </a:r>
+          <a:r>
+            <a:rPr lang="en-US" dirty="0" err="1" smtClean="0"/>
+            <a:t>Normalise</a:t>
+          </a:r>
+          <a:r>
+            <a:rPr lang="en-US" dirty="0" smtClean="0"/>
+            <a:t> continuous features
+</a:t>
+          </a:r>
+          <a:r>
+            <a:rPr lang="en-US" dirty="0" err="1" smtClean="0"/>
+            <a:t>Normalise</a:t>
+          </a:r>
+          <a:r>
+            <a:rPr lang="en-US" dirty="0" smtClean="0"/>
+            <a:t> labels
+</a:t>
+          </a:r>
+          <a:r>
+            <a:rPr lang="en-US" dirty="0" err="1" smtClean="0"/>
+            <a:t>Initialise</a:t>
+          </a:r>
+          <a:r>
+            <a:rPr lang="en-US" dirty="0" smtClean="0"/>
+            <a:t> population</a:t>
+          </a:r>
+          <a:endParaRPr lang="en-US" dirty="0"/>
         </a:p>
       </dgm:t>
     </dgm:pt>
@@ -964,114 +995,6 @@
         </a:p>
       </dgm:t>
     </dgm:pt>
-    <dgm:pt modelId="{97AFB725-9839-43BA-B026-0DD6AA03AD9C}">
-      <dgm:prSet phldrT="[Text]"/>
-      <dgm:spPr/>
-      <dgm:t>
-        <a:bodyPr/>
-        <a:lstStyle/>
-        <a:p>
-          <a:r>
-            <a:rPr lang="en-US" dirty="0"/>
-            <a:t>Task description</a:t>
-          </a:r>
-        </a:p>
-      </dgm:t>
-    </dgm:pt>
-    <dgm:pt modelId="{CC01022B-5039-457F-931E-79459E3C1DC4}" type="parTrans" cxnId="{97004F90-D1DB-4A84-A8AE-504DE1F07341}">
-      <dgm:prSet/>
-      <dgm:spPr/>
-      <dgm:t>
-        <a:bodyPr/>
-        <a:lstStyle/>
-        <a:p>
-          <a:endParaRPr lang="en-US"/>
-        </a:p>
-      </dgm:t>
-    </dgm:pt>
-    <dgm:pt modelId="{D5C26250-A06D-4B41-BC14-92648809C21F}" type="sibTrans" cxnId="{97004F90-D1DB-4A84-A8AE-504DE1F07341}">
-      <dgm:prSet/>
-      <dgm:spPr/>
-      <dgm:t>
-        <a:bodyPr/>
-        <a:lstStyle/>
-        <a:p>
-          <a:endParaRPr lang="en-US"/>
-        </a:p>
-      </dgm:t>
-    </dgm:pt>
-    <dgm:pt modelId="{B86124A4-14C7-49C7-A342-9B2C2B94980B}">
-      <dgm:prSet phldrT="[Text]"/>
-      <dgm:spPr/>
-      <dgm:t>
-        <a:bodyPr/>
-        <a:lstStyle/>
-        <a:p>
-          <a:r>
-            <a:rPr lang="en-US" dirty="0"/>
-            <a:t>Task description</a:t>
-          </a:r>
-        </a:p>
-      </dgm:t>
-    </dgm:pt>
-    <dgm:pt modelId="{B2F6F8FA-C3EE-485C-BFEC-A81570DC47D8}" type="parTrans" cxnId="{508A9F6A-C4F1-4147-A5F6-B89293B446E8}">
-      <dgm:prSet/>
-      <dgm:spPr/>
-      <dgm:t>
-        <a:bodyPr/>
-        <a:lstStyle/>
-        <a:p>
-          <a:endParaRPr lang="en-US"/>
-        </a:p>
-      </dgm:t>
-    </dgm:pt>
-    <dgm:pt modelId="{1114C752-8188-4E63-BFFC-E4081ACE9882}" type="sibTrans" cxnId="{508A9F6A-C4F1-4147-A5F6-B89293B446E8}">
-      <dgm:prSet/>
-      <dgm:spPr/>
-      <dgm:t>
-        <a:bodyPr/>
-        <a:lstStyle/>
-        <a:p>
-          <a:endParaRPr lang="en-US"/>
-        </a:p>
-      </dgm:t>
-    </dgm:pt>
-    <dgm:pt modelId="{A97FC57D-50D6-4D43-99C3-06D09820F122}">
-      <dgm:prSet phldrT="[Text]"/>
-      <dgm:spPr/>
-      <dgm:t>
-        <a:bodyPr/>
-        <a:lstStyle/>
-        <a:p>
-          <a:r>
-            <a:rPr lang="en-US" dirty="0"/>
-            <a:t>Task description</a:t>
-          </a:r>
-        </a:p>
-      </dgm:t>
-    </dgm:pt>
-    <dgm:pt modelId="{5DD877C7-E4D9-4A68-A305-5A7689D3DBE7}" type="parTrans" cxnId="{D286A548-6BB0-4DED-9FB5-D87042DDBE0A}">
-      <dgm:prSet/>
-      <dgm:spPr/>
-      <dgm:t>
-        <a:bodyPr/>
-        <a:lstStyle/>
-        <a:p>
-          <a:endParaRPr lang="en-US"/>
-        </a:p>
-      </dgm:t>
-    </dgm:pt>
-    <dgm:pt modelId="{C17BCABE-BEF2-4CC4-B037-B6B4866665CD}" type="sibTrans" cxnId="{D286A548-6BB0-4DED-9FB5-D87042DDBE0A}">
-      <dgm:prSet/>
-      <dgm:spPr/>
-      <dgm:t>
-        <a:bodyPr/>
-        <a:lstStyle/>
-        <a:p>
-          <a:endParaRPr lang="en-US"/>
-        </a:p>
-      </dgm:t>
-    </dgm:pt>
     <dgm:pt modelId="{B6E26FFC-9977-4BBC-BEC7-3D6B63754E52}">
       <dgm:prSet phldrT="[Text]"/>
       <dgm:spPr/>
@@ -1081,7 +1004,7 @@
         <a:p>
           <a:r>
             <a:rPr lang="en-US" dirty="0" smtClean="0"/>
-            <a:t>Breed</a:t>
+            <a:t>Parent selection and breeding</a:t>
           </a:r>
           <a:endParaRPr lang="en-US" dirty="0"/>
         </a:p>
@@ -1117,9 +1040,10 @@
         <a:lstStyle/>
         <a:p>
           <a:r>
-            <a:rPr lang="en-US" dirty="0"/>
-            <a:t>Task description</a:t>
+            <a:rPr lang="en-AU" dirty="0" smtClean="0"/>
+            <a:t>Two approaches:</a:t>
           </a:r>
+          <a:endParaRPr lang="en-US" dirty="0"/>
         </a:p>
       </dgm:t>
     </dgm:pt>
@@ -1145,78 +1069,6 @@
         </a:p>
       </dgm:t>
     </dgm:pt>
-    <dgm:pt modelId="{62831651-7C26-466C-BAA4-31EA8D14E47A}">
-      <dgm:prSet phldrT="[Text]"/>
-      <dgm:spPr/>
-      <dgm:t>
-        <a:bodyPr/>
-        <a:lstStyle/>
-        <a:p>
-          <a:r>
-            <a:rPr lang="en-US" dirty="0"/>
-            <a:t>Task description</a:t>
-          </a:r>
-        </a:p>
-      </dgm:t>
-    </dgm:pt>
-    <dgm:pt modelId="{0F3EB6E4-07A5-4199-9C2F-8B91F53579FE}" type="parTrans" cxnId="{59DDA576-1BA9-49E8-9D1D-361FF667A19A}">
-      <dgm:prSet/>
-      <dgm:spPr/>
-      <dgm:t>
-        <a:bodyPr/>
-        <a:lstStyle/>
-        <a:p>
-          <a:endParaRPr lang="en-US"/>
-        </a:p>
-      </dgm:t>
-    </dgm:pt>
-    <dgm:pt modelId="{0D19FA60-5F9C-420B-AD2F-A0656A7F0783}" type="sibTrans" cxnId="{59DDA576-1BA9-49E8-9D1D-361FF667A19A}">
-      <dgm:prSet/>
-      <dgm:spPr/>
-      <dgm:t>
-        <a:bodyPr/>
-        <a:lstStyle/>
-        <a:p>
-          <a:endParaRPr lang="en-US"/>
-        </a:p>
-      </dgm:t>
-    </dgm:pt>
-    <dgm:pt modelId="{44B2544A-D122-4B95-A36C-B03D9E272B48}">
-      <dgm:prSet phldrT="[Text]"/>
-      <dgm:spPr/>
-      <dgm:t>
-        <a:bodyPr/>
-        <a:lstStyle/>
-        <a:p>
-          <a:r>
-            <a:rPr lang="en-US" dirty="0"/>
-            <a:t>Task description</a:t>
-          </a:r>
-        </a:p>
-      </dgm:t>
-    </dgm:pt>
-    <dgm:pt modelId="{9EE40E78-C1B8-4A87-A668-53AD816CED24}" type="parTrans" cxnId="{F89EA6DF-D106-435E-9337-D23286A767A6}">
-      <dgm:prSet/>
-      <dgm:spPr/>
-      <dgm:t>
-        <a:bodyPr/>
-        <a:lstStyle/>
-        <a:p>
-          <a:endParaRPr lang="en-US"/>
-        </a:p>
-      </dgm:t>
-    </dgm:pt>
-    <dgm:pt modelId="{F32DECE0-DC7F-4DCF-A10D-96A117A49197}" type="sibTrans" cxnId="{F89EA6DF-D106-435E-9337-D23286A767A6}">
-      <dgm:prSet/>
-      <dgm:spPr/>
-      <dgm:t>
-        <a:bodyPr/>
-        <a:lstStyle/>
-        <a:p>
-          <a:endParaRPr lang="en-US"/>
-        </a:p>
-      </dgm:t>
-    </dgm:pt>
     <dgm:pt modelId="{6D0E5D9F-7263-4526-A227-51301233F549}">
       <dgm:prSet phldrT="[Text]"/>
       <dgm:spPr/>
@@ -1226,11 +1078,7 @@
         <a:p>
           <a:r>
             <a:rPr lang="en-US" dirty="0" smtClean="0"/>
-            <a:t>Add mutations/</a:t>
-          </a:r>
-          <a:r>
-            <a:rPr lang="en-US" dirty="0" err="1" smtClean="0"/>
-            <a:t>randomisation</a:t>
+            <a:t>Offspring production</a:t>
           </a:r>
           <a:endParaRPr lang="en-US" dirty="0"/>
         </a:p>
@@ -1266,9 +1114,11 @@
         <a:lstStyle/>
         <a:p>
           <a:r>
-            <a:rPr lang="en-US" dirty="0"/>
-            <a:t>Task description</a:t>
+            <a:rPr lang="en-US" dirty="0" smtClean="0"/>
+            <a:t>Crossover
+Mutation</a:t>
           </a:r>
+          <a:endParaRPr lang="en-US" dirty="0"/>
         </a:p>
       </dgm:t>
     </dgm:pt>
@@ -1294,42 +1144,6 @@
         </a:p>
       </dgm:t>
     </dgm:pt>
-    <dgm:pt modelId="{357008B7-F3FD-489F-A410-81C9A9EFE4DA}">
-      <dgm:prSet phldrT="[Text]"/>
-      <dgm:spPr/>
-      <dgm:t>
-        <a:bodyPr/>
-        <a:lstStyle/>
-        <a:p>
-          <a:r>
-            <a:rPr lang="en-US" dirty="0"/>
-            <a:t>Task description</a:t>
-          </a:r>
-        </a:p>
-      </dgm:t>
-    </dgm:pt>
-    <dgm:pt modelId="{ED5EFE54-4C6D-4A88-939B-CE66C6668425}" type="parTrans" cxnId="{8910F93B-7180-4A52-9856-879D102D33F8}">
-      <dgm:prSet/>
-      <dgm:spPr/>
-      <dgm:t>
-        <a:bodyPr/>
-        <a:lstStyle/>
-        <a:p>
-          <a:endParaRPr lang="en-US"/>
-        </a:p>
-      </dgm:t>
-    </dgm:pt>
-    <dgm:pt modelId="{87BC108C-4915-4A4B-8565-E4BD28BA3C35}" type="sibTrans" cxnId="{8910F93B-7180-4A52-9856-879D102D33F8}">
-      <dgm:prSet/>
-      <dgm:spPr/>
-      <dgm:t>
-        <a:bodyPr/>
-        <a:lstStyle/>
-        <a:p>
-          <a:endParaRPr lang="en-US"/>
-        </a:p>
-      </dgm:t>
-    </dgm:pt>
     <dgm:pt modelId="{E5E95E82-EF79-43CA-AA86-43B0E1CBCD3F}">
       <dgm:prSet phldrT="[Text]"/>
       <dgm:spPr/>
@@ -1339,7 +1153,7 @@
         <a:p>
           <a:r>
             <a:rPr lang="en-US" dirty="0" smtClean="0"/>
-            <a:t>Output predicted values?</a:t>
+            <a:t>Application of Fitness</a:t>
           </a:r>
           <a:endParaRPr lang="en-US" dirty="0"/>
         </a:p>
@@ -1375,9 +1189,11 @@
         <a:lstStyle/>
         <a:p>
           <a:r>
-            <a:rPr lang="en-US" dirty="0"/>
-            <a:t>Task description</a:t>
+            <a:rPr lang="en-AU" dirty="0" smtClean="0"/>
+            <a:t>Cull weakest chromosomes in selection of next generation
+Continue evolution with next generation</a:t>
           </a:r>
+          <a:endParaRPr lang="en-US" dirty="0"/>
         </a:p>
       </dgm:t>
     </dgm:pt>
@@ -1403,7 +1219,7 @@
         </a:p>
       </dgm:t>
     </dgm:pt>
-    <dgm:pt modelId="{37A7C994-CC74-44DD-8777-ED6736B35821}">
+    <dgm:pt modelId="{FB9DB898-4B32-484F-AD1F-980907AC0474}">
       <dgm:prSet phldrT="[Text]"/>
       <dgm:spPr/>
       <dgm:t>
@@ -1411,13 +1227,14 @@
         <a:lstStyle/>
         <a:p>
           <a:r>
-            <a:rPr lang="en-US" dirty="0"/>
-            <a:t>Task description</a:t>
+            <a:rPr lang="en-AU" dirty="0" smtClean="0"/>
+            <a:t>Stochastically select based on weightings</a:t>
           </a:r>
+          <a:endParaRPr lang="en-US" dirty="0"/>
         </a:p>
       </dgm:t>
     </dgm:pt>
-    <dgm:pt modelId="{03F017E7-7E3C-4E2C-9CEF-B07099F38801}" type="parTrans" cxnId="{1C5CE732-A00F-4C06-A1A8-B209BC6B496D}">
+    <dgm:pt modelId="{830DCE4B-871D-4B40-999F-D04290298AE2}" type="parTrans" cxnId="{F3685127-4799-4102-A964-B09309F4EE24}">
       <dgm:prSet/>
       <dgm:spPr/>
       <dgm:t>
@@ -1428,7 +1245,118 @@
         </a:p>
       </dgm:t>
     </dgm:pt>
-    <dgm:pt modelId="{118572A4-3B5E-487E-8015-6A319369077F}" type="sibTrans" cxnId="{1C5CE732-A00F-4C06-A1A8-B209BC6B496D}">
+    <dgm:pt modelId="{9CE4EF2A-4CD8-4E1B-9E09-48BDF9FDE119}" type="sibTrans" cxnId="{F3685127-4799-4102-A964-B09309F4EE24}">
+      <dgm:prSet/>
+      <dgm:spPr/>
+      <dgm:t>
+        <a:bodyPr/>
+        <a:lstStyle/>
+        <a:p>
+          <a:endParaRPr lang="en-US"/>
+        </a:p>
+      </dgm:t>
+    </dgm:pt>
+    <dgm:pt modelId="{1078F95A-DA83-4AF4-934D-E5C1BBDAC3E6}">
+      <dgm:prSet phldrT="[Text]"/>
+      <dgm:spPr/>
+      <dgm:t>
+        <a:bodyPr/>
+        <a:lstStyle/>
+        <a:p>
+          <a:r>
+            <a:rPr lang="en-AU" dirty="0" smtClean="0"/>
+            <a:t>Select fittest</a:t>
+          </a:r>
+          <a:endParaRPr lang="en-US" dirty="0"/>
+        </a:p>
+      </dgm:t>
+    </dgm:pt>
+    <dgm:pt modelId="{76B28061-FDD1-4776-AE1F-49C05DB29127}" type="parTrans" cxnId="{F69EC280-A4D9-45CC-9A68-EC14144882BF}">
+      <dgm:prSet/>
+      <dgm:spPr/>
+      <dgm:t>
+        <a:bodyPr/>
+        <a:lstStyle/>
+        <a:p>
+          <a:endParaRPr lang="en-US"/>
+        </a:p>
+      </dgm:t>
+    </dgm:pt>
+    <dgm:pt modelId="{231FAE90-B3FE-4320-B91F-92A83D3BFAD5}" type="sibTrans" cxnId="{F69EC280-A4D9-45CC-9A68-EC14144882BF}">
+      <dgm:prSet/>
+      <dgm:spPr/>
+      <dgm:t>
+        <a:bodyPr/>
+        <a:lstStyle/>
+        <a:p>
+          <a:endParaRPr lang="en-US"/>
+        </a:p>
+      </dgm:t>
+    </dgm:pt>
+    <dgm:pt modelId="{3D3D082A-AD61-46D1-BE8C-1D8F740581A1}">
+      <dgm:prSet phldrT="[Text]"/>
+      <dgm:spPr/>
+      <dgm:t>
+        <a:bodyPr/>
+        <a:lstStyle/>
+        <a:p>
+          <a:r>
+            <a:rPr lang="en-AU" dirty="0" smtClean="0"/>
+            <a:t>Couple parents</a:t>
+          </a:r>
+          <a:endParaRPr lang="en-US" dirty="0"/>
+        </a:p>
+      </dgm:t>
+    </dgm:pt>
+    <dgm:pt modelId="{EE28A659-D406-4907-A229-659FBC24B12D}" type="parTrans" cxnId="{8074E4BA-3FF9-437A-B0C1-6C64D1F726DD}">
+      <dgm:prSet/>
+      <dgm:spPr/>
+      <dgm:t>
+        <a:bodyPr/>
+        <a:lstStyle/>
+        <a:p>
+          <a:endParaRPr lang="en-US"/>
+        </a:p>
+      </dgm:t>
+    </dgm:pt>
+    <dgm:pt modelId="{313C4D65-2636-422C-BEBC-F382AD77C11B}" type="sibTrans" cxnId="{8074E4BA-3FF9-437A-B0C1-6C64D1F726DD}">
+      <dgm:prSet/>
+      <dgm:spPr/>
+      <dgm:t>
+        <a:bodyPr/>
+        <a:lstStyle/>
+        <a:p>
+          <a:endParaRPr lang="en-US"/>
+        </a:p>
+      </dgm:t>
+    </dgm:pt>
+    <dgm:pt modelId="{5B3BBB70-0965-4D01-AD7F-AB5DF89B11CB}">
+      <dgm:prSet phldrT="[Text]"/>
+      <dgm:spPr/>
+      <dgm:t>
+        <a:bodyPr/>
+        <a:lstStyle/>
+        <a:p>
+          <a:r>
+            <a:rPr lang="en-US" dirty="0" smtClean="0"/>
+            <a:t>Track progress</a:t>
+          </a:r>
+          <a:endParaRPr lang="en-US" dirty="0"/>
+        </a:p>
+      </dgm:t>
+    </dgm:pt>
+    <dgm:pt modelId="{371040C2-CECE-4936-89C5-AF88463F276A}" type="parTrans" cxnId="{8E6AAD17-DF1F-4AE3-B718-1A943B825D6E}">
+      <dgm:prSet/>
+      <dgm:spPr/>
+      <dgm:t>
+        <a:bodyPr/>
+        <a:lstStyle/>
+        <a:p>
+          <a:endParaRPr lang="en-US"/>
+        </a:p>
+      </dgm:t>
+    </dgm:pt>
+    <dgm:pt modelId="{626BDCE0-6B0B-4A1C-B3F9-32DBFA9C3384}" type="sibTrans" cxnId="{8E6AAD17-DF1F-4AE3-B718-1A943B825D6E}">
       <dgm:prSet/>
       <dgm:spPr/>
       <dgm:t>
@@ -1529,37 +1457,31 @@
     </dgm:pt>
   </dgm:ptLst>
   <dgm:cxnLst>
-    <dgm:cxn modelId="{1B9593D8-0118-451B-8B48-CC6C91B73C1B}" type="presOf" srcId="{B86124A4-14C7-49C7-A342-9B2C2B94980B}" destId="{98302F07-D6A9-46A5-9807-EBF6C9F5B2DD}" srcOrd="0" destOrd="3" presId="urn:microsoft.com/office/officeart/2005/8/layout/hList6"/>
     <dgm:cxn modelId="{1B8E71B0-2D3A-4AB0-8843-CFDACEDC3198}" srcId="{6D0E5D9F-7263-4526-A227-51301233F549}" destId="{F3256203-D9D1-492A-B801-68C1A32486F0}" srcOrd="0" destOrd="0" parTransId="{E9A20291-2E30-4C14-BB7D-DC095A20ECB6}" sibTransId="{6C9440D0-8847-40C0-98BC-2B5EA5745C3A}"/>
-    <dgm:cxn modelId="{508A9F6A-C4F1-4147-A5F6-B89293B446E8}" srcId="{082E8A29-955A-4C7C-A174-3E9DCD4DC89B}" destId="{B86124A4-14C7-49C7-A342-9B2C2B94980B}" srcOrd="2" destOrd="0" parTransId="{B2F6F8FA-C3EE-485C-BFEC-A81570DC47D8}" sibTransId="{1114C752-8188-4E63-BFFC-E4081ACE9882}"/>
-    <dgm:cxn modelId="{F89EA6DF-D106-435E-9337-D23286A767A6}" srcId="{B6E26FFC-9977-4BBC-BEC7-3D6B63754E52}" destId="{44B2544A-D122-4B95-A36C-B03D9E272B48}" srcOrd="2" destOrd="0" parTransId="{9EE40E78-C1B8-4A87-A668-53AD816CED24}" sibTransId="{F32DECE0-DC7F-4DCF-A10D-96A117A49197}"/>
-    <dgm:cxn modelId="{3B50A2DD-8777-42C9-93E1-40A37E404C87}" type="presOf" srcId="{44B2544A-D122-4B95-A36C-B03D9E272B48}" destId="{DAD9059A-916A-4916-A2A8-B42491568DD3}" srcOrd="0" destOrd="3" presId="urn:microsoft.com/office/officeart/2005/8/layout/hList6"/>
     <dgm:cxn modelId="{C8C462C6-33A3-4E8B-91FE-36DBE92F1C4A}" srcId="{CF9055CF-8DEB-4A02-949A-DE72B6AC5D37}" destId="{6D0E5D9F-7263-4526-A227-51301233F549}" srcOrd="2" destOrd="0" parTransId="{23416D07-25F8-426C-BC65-639E6BCF4D6D}" sibTransId="{DE289E29-1989-4D8E-8AA6-F030105B3F13}"/>
-    <dgm:cxn modelId="{59DDA576-1BA9-49E8-9D1D-361FF667A19A}" srcId="{B6E26FFC-9977-4BBC-BEC7-3D6B63754E52}" destId="{62831651-7C26-466C-BAA4-31EA8D14E47A}" srcOrd="1" destOrd="0" parTransId="{0F3EB6E4-07A5-4199-9C2F-8B91F53579FE}" sibTransId="{0D19FA60-5F9C-420B-AD2F-A0656A7F0783}"/>
+    <dgm:cxn modelId="{3C1F7B85-C6B5-47D7-A964-B7FB333C96CC}" type="presOf" srcId="{1078F95A-DA83-4AF4-934D-E5C1BBDAC3E6}" destId="{DAD9059A-916A-4916-A2A8-B42491568DD3}" srcOrd="0" destOrd="2" presId="urn:microsoft.com/office/officeart/2005/8/layout/hList6"/>
     <dgm:cxn modelId="{A76240AD-13F6-40C0-BD9B-102D5EC0AE51}" srcId="{CF9055CF-8DEB-4A02-949A-DE72B6AC5D37}" destId="{E5E95E82-EF79-43CA-AA86-43B0E1CBCD3F}" srcOrd="3" destOrd="0" parTransId="{FD76A3AE-1B6C-45A0-8E84-63160283749F}" sibTransId="{BF76010C-5523-4E13-B3E7-886DCE6AEBD4}"/>
+    <dgm:cxn modelId="{697517A5-AE14-4624-ACD6-19FAEBB89C73}" type="presOf" srcId="{FB9DB898-4B32-484F-AD1F-980907AC0474}" destId="{DAD9059A-916A-4916-A2A8-B42491568DD3}" srcOrd="0" destOrd="3" presId="urn:microsoft.com/office/officeart/2005/8/layout/hList6"/>
     <dgm:cxn modelId="{FB8541C0-3895-4553-A4C7-34B81A3C4A0B}" srcId="{E5E95E82-EF79-43CA-AA86-43B0E1CBCD3F}" destId="{A81358E0-3DE7-41AD-A28C-ABB22548B1F6}" srcOrd="0" destOrd="0" parTransId="{262E0B94-6EA9-4797-B705-959D7B185F91}" sibTransId="{77756FBB-BF6C-4D78-803E-BCC851F1DA03}"/>
     <dgm:cxn modelId="{CC1A92EB-2672-4443-858D-BCA16F76F740}" type="presOf" srcId="{F3256203-D9D1-492A-B801-68C1A32486F0}" destId="{25A33852-3C4B-4406-8856-3A4D6201948C}" srcOrd="0" destOrd="1" presId="urn:microsoft.com/office/officeart/2005/8/layout/hList6"/>
     <dgm:cxn modelId="{2FA258D4-5B38-426D-B0D7-CD8F217A1137}" type="presOf" srcId="{E5E95E82-EF79-43CA-AA86-43B0E1CBCD3F}" destId="{86146B22-5360-4D1B-AC91-3378F10134EE}" srcOrd="0" destOrd="0" presId="urn:microsoft.com/office/officeart/2005/8/layout/hList6"/>
+    <dgm:cxn modelId="{73CA1E5E-292C-4C83-A579-D3D7A9B594B4}" type="presOf" srcId="{5B3BBB70-0965-4D01-AD7F-AB5DF89B11CB}" destId="{86146B22-5360-4D1B-AC91-3378F10134EE}" srcOrd="0" destOrd="2" presId="urn:microsoft.com/office/officeart/2005/8/layout/hList6"/>
     <dgm:cxn modelId="{F4F3BD4C-7DE7-449F-8ECF-B43B2B86F2EB}" type="presOf" srcId="{CBCC21F5-552F-4D39-812E-6FCD4A366F58}" destId="{DAD9059A-916A-4916-A2A8-B42491568DD3}" srcOrd="0" destOrd="1" presId="urn:microsoft.com/office/officeart/2005/8/layout/hList6"/>
     <dgm:cxn modelId="{67A03D8F-F327-4A9F-ABBC-1EB67EFD1ECB}" srcId="{082E8A29-955A-4C7C-A174-3E9DCD4DC89B}" destId="{23A0DE4A-FE92-496E-B335-3433CEFB74E9}" srcOrd="0" destOrd="0" parTransId="{68935D38-FEDC-4CD3-8002-43CB3944BEAF}" sibTransId="{55DF926D-029A-4E18-95C4-77A5A37CAE40}"/>
-    <dgm:cxn modelId="{ECB535CD-5106-41E2-A5E6-D382C3792033}" type="presOf" srcId="{357008B7-F3FD-489F-A410-81C9A9EFE4DA}" destId="{25A33852-3C4B-4406-8856-3A4D6201948C}" srcOrd="0" destOrd="2" presId="urn:microsoft.com/office/officeart/2005/8/layout/hList6"/>
-    <dgm:cxn modelId="{AB981D0D-0AD5-4DD6-BA19-D4E75ECF1C7D}" type="presOf" srcId="{A97FC57D-50D6-4D43-99C3-06D09820F122}" destId="{98302F07-D6A9-46A5-9807-EBF6C9F5B2DD}" srcOrd="0" destOrd="4" presId="urn:microsoft.com/office/officeart/2005/8/layout/hList6"/>
     <dgm:cxn modelId="{2986897A-7787-444F-B6C8-41F3823EF3C1}" srcId="{CF9055CF-8DEB-4A02-949A-DE72B6AC5D37}" destId="{082E8A29-955A-4C7C-A174-3E9DCD4DC89B}" srcOrd="0" destOrd="0" parTransId="{BA7938E6-8DFA-40B7-B4C4-EACC6D85FC31}" sibTransId="{C2176686-D23E-48EB-9D1B-1A1B46236638}"/>
     <dgm:cxn modelId="{5351B217-259B-4E6A-85F5-2E408BEB0764}" type="presOf" srcId="{082E8A29-955A-4C7C-A174-3E9DCD4DC89B}" destId="{98302F07-D6A9-46A5-9807-EBF6C9F5B2DD}" srcOrd="0" destOrd="0" presId="urn:microsoft.com/office/officeart/2005/8/layout/hList6"/>
-    <dgm:cxn modelId="{9CB4B27D-95A7-458D-A9CA-7754788DD095}" type="presOf" srcId="{62831651-7C26-466C-BAA4-31EA8D14E47A}" destId="{DAD9059A-916A-4916-A2A8-B42491568DD3}" srcOrd="0" destOrd="2" presId="urn:microsoft.com/office/officeart/2005/8/layout/hList6"/>
     <dgm:cxn modelId="{0676BA07-1135-49D0-993A-27A9F99FC0CD}" type="presOf" srcId="{B6E26FFC-9977-4BBC-BEC7-3D6B63754E52}" destId="{DAD9059A-916A-4916-A2A8-B42491568DD3}" srcOrd="0" destOrd="0" presId="urn:microsoft.com/office/officeart/2005/8/layout/hList6"/>
-    <dgm:cxn modelId="{D286A548-6BB0-4DED-9FB5-D87042DDBE0A}" srcId="{082E8A29-955A-4C7C-A174-3E9DCD4DC89B}" destId="{A97FC57D-50D6-4D43-99C3-06D09820F122}" srcOrd="3" destOrd="0" parTransId="{5DD877C7-E4D9-4A68-A305-5A7689D3DBE7}" sibTransId="{C17BCABE-BEF2-4CC4-B037-B6B4866665CD}"/>
     <dgm:cxn modelId="{DC53BA63-76BA-413A-ACCE-B7609C3FDC8E}" type="presOf" srcId="{A81358E0-3DE7-41AD-A28C-ABB22548B1F6}" destId="{86146B22-5360-4D1B-AC91-3378F10134EE}" srcOrd="0" destOrd="1" presId="urn:microsoft.com/office/officeart/2005/8/layout/hList6"/>
     <dgm:cxn modelId="{C06DA1C3-D38F-43B1-B24E-E80592CC29EC}" type="presOf" srcId="{23A0DE4A-FE92-496E-B335-3433CEFB74E9}" destId="{98302F07-D6A9-46A5-9807-EBF6C9F5B2DD}" srcOrd="0" destOrd="1" presId="urn:microsoft.com/office/officeart/2005/8/layout/hList6"/>
     <dgm:cxn modelId="{24179AE2-AA7E-4702-A358-E95F80152CCA}" type="presOf" srcId="{CF9055CF-8DEB-4A02-949A-DE72B6AC5D37}" destId="{6F1872F4-A030-4D64-A17C-72EA1ABBD62E}" srcOrd="0" destOrd="0" presId="urn:microsoft.com/office/officeart/2005/8/layout/hList6"/>
-    <dgm:cxn modelId="{729DA21F-0A99-4CC3-ACFF-2A00EDCAA358}" type="presOf" srcId="{37A7C994-CC74-44DD-8777-ED6736B35821}" destId="{86146B22-5360-4D1B-AC91-3378F10134EE}" srcOrd="0" destOrd="2" presId="urn:microsoft.com/office/officeart/2005/8/layout/hList6"/>
-    <dgm:cxn modelId="{97004F90-D1DB-4A84-A8AE-504DE1F07341}" srcId="{082E8A29-955A-4C7C-A174-3E9DCD4DC89B}" destId="{97AFB725-9839-43BA-B026-0DD6AA03AD9C}" srcOrd="1" destOrd="0" parTransId="{CC01022B-5039-457F-931E-79459E3C1DC4}" sibTransId="{D5C26250-A06D-4B41-BC14-92648809C21F}"/>
     <dgm:cxn modelId="{17E73148-9C08-4999-B21E-F3C5A0E3FC0C}" srcId="{CF9055CF-8DEB-4A02-949A-DE72B6AC5D37}" destId="{B6E26FFC-9977-4BBC-BEC7-3D6B63754E52}" srcOrd="1" destOrd="0" parTransId="{5CEFBD89-2F4F-4B51-A98A-0F3C86494166}" sibTransId="{48634C00-2335-4923-9072-EB7482323D9C}"/>
-    <dgm:cxn modelId="{1C5CE732-A00F-4C06-A1A8-B209BC6B496D}" srcId="{E5E95E82-EF79-43CA-AA86-43B0E1CBCD3F}" destId="{37A7C994-CC74-44DD-8777-ED6736B35821}" srcOrd="1" destOrd="0" parTransId="{03F017E7-7E3C-4E2C-9CEF-B07099F38801}" sibTransId="{118572A4-3B5E-487E-8015-6A319369077F}"/>
-    <dgm:cxn modelId="{8910F93B-7180-4A52-9856-879D102D33F8}" srcId="{6D0E5D9F-7263-4526-A227-51301233F549}" destId="{357008B7-F3FD-489F-A410-81C9A9EFE4DA}" srcOrd="1" destOrd="0" parTransId="{ED5EFE54-4C6D-4A88-939B-CE66C6668425}" sibTransId="{87BC108C-4915-4A4B-8565-E4BD28BA3C35}"/>
+    <dgm:cxn modelId="{F3685127-4799-4102-A964-B09309F4EE24}" srcId="{CBCC21F5-552F-4D39-812E-6FCD4A366F58}" destId="{FB9DB898-4B32-484F-AD1F-980907AC0474}" srcOrd="1" destOrd="0" parTransId="{830DCE4B-871D-4B40-999F-D04290298AE2}" sibTransId="{9CE4EF2A-4CD8-4E1B-9E09-48BDF9FDE119}"/>
+    <dgm:cxn modelId="{8074E4BA-3FF9-437A-B0C1-6C64D1F726DD}" srcId="{B6E26FFC-9977-4BBC-BEC7-3D6B63754E52}" destId="{3D3D082A-AD61-46D1-BE8C-1D8F740581A1}" srcOrd="1" destOrd="0" parTransId="{EE28A659-D406-4907-A229-659FBC24B12D}" sibTransId="{313C4D65-2636-422C-BEBC-F382AD77C11B}"/>
+    <dgm:cxn modelId="{71621875-3D25-41E0-B4BC-44EDAA7A29D1}" type="presOf" srcId="{3D3D082A-AD61-46D1-BE8C-1D8F740581A1}" destId="{DAD9059A-916A-4916-A2A8-B42491568DD3}" srcOrd="0" destOrd="4" presId="urn:microsoft.com/office/officeart/2005/8/layout/hList6"/>
     <dgm:cxn modelId="{3C41F2E0-4620-40B4-9857-68872B278EFB}" srcId="{B6E26FFC-9977-4BBC-BEC7-3D6B63754E52}" destId="{CBCC21F5-552F-4D39-812E-6FCD4A366F58}" srcOrd="0" destOrd="0" parTransId="{4A973A1C-85F1-4969-A536-D29940229E2C}" sibTransId="{3640B940-6901-481F-ADF7-6B77DEEED764}"/>
     <dgm:cxn modelId="{77BD0D2D-7C4E-49B3-9A72-0FD33F32D294}" type="presOf" srcId="{6D0E5D9F-7263-4526-A227-51301233F549}" destId="{25A33852-3C4B-4406-8856-3A4D6201948C}" srcOrd="0" destOrd="0" presId="urn:microsoft.com/office/officeart/2005/8/layout/hList6"/>
-    <dgm:cxn modelId="{3AE2742D-7673-4553-BCDD-292AE3B4BC50}" type="presOf" srcId="{97AFB725-9839-43BA-B026-0DD6AA03AD9C}" destId="{98302F07-D6A9-46A5-9807-EBF6C9F5B2DD}" srcOrd="0" destOrd="2" presId="urn:microsoft.com/office/officeart/2005/8/layout/hList6"/>
+    <dgm:cxn modelId="{F69EC280-A4D9-45CC-9A68-EC14144882BF}" srcId="{CBCC21F5-552F-4D39-812E-6FCD4A366F58}" destId="{1078F95A-DA83-4AF4-934D-E5C1BBDAC3E6}" srcOrd="0" destOrd="0" parTransId="{76B28061-FDD1-4776-AE1F-49C05DB29127}" sibTransId="{231FAE90-B3FE-4320-B91F-92A83D3BFAD5}"/>
+    <dgm:cxn modelId="{8E6AAD17-DF1F-4AE3-B718-1A943B825D6E}" srcId="{E5E95E82-EF79-43CA-AA86-43B0E1CBCD3F}" destId="{5B3BBB70-0965-4D01-AD7F-AB5DF89B11CB}" srcOrd="1" destOrd="0" parTransId="{371040C2-CECE-4936-89C5-AF88463F276A}" sibTransId="{626BDCE0-6B0B-4A1C-B3F9-32DBFA9C3384}"/>
     <dgm:cxn modelId="{D4055BC1-25B1-4CD1-BF08-20C154FADF73}" type="presParOf" srcId="{6F1872F4-A030-4D64-A17C-72EA1ABBD62E}" destId="{98302F07-D6A9-46A5-9807-EBF6C9F5B2DD}" srcOrd="0" destOrd="0" presId="urn:microsoft.com/office/officeart/2005/8/layout/hList6"/>
     <dgm:cxn modelId="{584E2F3E-994B-49B2-AD46-0E8D6E4A468B}" type="presParOf" srcId="{6F1872F4-A030-4D64-A17C-72EA1ABBD62E}" destId="{6681DF6F-8E98-430C-9A87-14BEC6C3269E}" srcOrd="1" destOrd="0" presId="urn:microsoft.com/office/officeart/2005/8/layout/hList6"/>
     <dgm:cxn modelId="{FD54A181-98DF-439C-9CA4-93CD1333DEC4}" type="presParOf" srcId="{6F1872F4-A030-4D64-A17C-72EA1ABBD62E}" destId="{DAD9059A-916A-4916-A2A8-B42491568DD3}" srcOrd="2" destOrd="0" presId="urn:microsoft.com/office/officeart/2005/8/layout/hList6"/>
@@ -1664,12 +1586,12 @@
         </a:fontRef>
       </dsp:style>
       <dsp:txBody>
-        <a:bodyPr spcFirstLastPara="0" vert="horz" wrap="square" lIns="95250" tIns="0" rIns="97234" bIns="0" numCol="1" spcCol="1270" anchor="t" anchorCtr="0">
+        <a:bodyPr spcFirstLastPara="0" vert="horz" wrap="square" lIns="133350" tIns="0" rIns="135558" bIns="0" numCol="1" spcCol="1270" anchor="t" anchorCtr="0">
           <a:noAutofit/>
         </a:bodyPr>
         <a:lstStyle/>
         <a:p>
-          <a:pPr lvl="0" algn="l" defTabSz="666750">
+          <a:pPr lvl="0" algn="l" defTabSz="933450">
             <a:lnSpc>
               <a:spcPct val="90000"/>
             </a:lnSpc>
@@ -1681,13 +1603,13 @@
             </a:spcAft>
           </a:pPr>
           <a:r>
-            <a:rPr lang="en-US" sz="1500" kern="1200" dirty="0" smtClean="0"/>
-            <a:t>Set up data genomes</a:t>
+            <a:rPr lang="en-US" sz="2100" kern="1200" dirty="0" smtClean="0"/>
+            <a:t>Prepare and setup GA</a:t>
           </a:r>
-          <a:endParaRPr lang="en-US" sz="1500" kern="1200" dirty="0"/>
+          <a:endParaRPr lang="en-US" sz="2100" kern="1200" dirty="0"/>
         </a:p>
         <a:p>
-          <a:pPr marL="114300" lvl="1" indent="-114300" algn="l" defTabSz="533400">
+          <a:pPr marL="171450" lvl="1" indent="-171450" algn="l" defTabSz="711200">
             <a:lnSpc>
               <a:spcPct val="90000"/>
             </a:lnSpc>
@@ -1700,63 +1622,37 @@
             <a:buChar char="••"/>
           </a:pPr>
           <a:r>
-            <a:rPr lang="en-US" sz="1200" kern="1200" dirty="0"/>
-            <a:t>Task description</a:t>
+            <a:rPr lang="en-US" sz="1600" kern="1200" dirty="0" smtClean="0"/>
+            <a:t>Map categorical features
+</a:t>
           </a:r>
-        </a:p>
-        <a:p>
-          <a:pPr marL="114300" lvl="1" indent="-114300" algn="l" defTabSz="533400">
-            <a:lnSpc>
-              <a:spcPct val="90000"/>
-            </a:lnSpc>
-            <a:spcBef>
-              <a:spcPct val="0"/>
-            </a:spcBef>
-            <a:spcAft>
-              <a:spcPct val="15000"/>
-            </a:spcAft>
-            <a:buChar char="••"/>
-          </a:pPr>
           <a:r>
-            <a:rPr lang="en-US" sz="1200" kern="1200" dirty="0"/>
-            <a:t>Task description</a:t>
+            <a:rPr lang="en-US" sz="1600" kern="1200" dirty="0" err="1" smtClean="0"/>
+            <a:t>Normalise</a:t>
           </a:r>
-        </a:p>
-        <a:p>
-          <a:pPr marL="114300" lvl="1" indent="-114300" algn="l" defTabSz="533400">
-            <a:lnSpc>
-              <a:spcPct val="90000"/>
-            </a:lnSpc>
-            <a:spcBef>
-              <a:spcPct val="0"/>
-            </a:spcBef>
-            <a:spcAft>
-              <a:spcPct val="15000"/>
-            </a:spcAft>
-            <a:buChar char="••"/>
-          </a:pPr>
           <a:r>
-            <a:rPr lang="en-US" sz="1200" kern="1200" dirty="0"/>
-            <a:t>Task description</a:t>
+            <a:rPr lang="en-US" sz="1600" kern="1200" dirty="0" smtClean="0"/>
+            <a:t> continuous features
+</a:t>
           </a:r>
-        </a:p>
-        <a:p>
-          <a:pPr marL="114300" lvl="1" indent="-114300" algn="l" defTabSz="533400">
-            <a:lnSpc>
-              <a:spcPct val="90000"/>
-            </a:lnSpc>
-            <a:spcBef>
-              <a:spcPct val="0"/>
-            </a:spcBef>
-            <a:spcAft>
-              <a:spcPct val="15000"/>
-            </a:spcAft>
-            <a:buChar char="••"/>
-          </a:pPr>
           <a:r>
-            <a:rPr lang="en-US" sz="1200" kern="1200" dirty="0"/>
-            <a:t>Task description</a:t>
+            <a:rPr lang="en-US" sz="1600" kern="1200" dirty="0" err="1" smtClean="0"/>
+            <a:t>Normalise</a:t>
           </a:r>
+          <a:r>
+            <a:rPr lang="en-US" sz="1600" kern="1200" dirty="0" smtClean="0"/>
+            <a:t> labels
+</a:t>
+          </a:r>
+          <a:r>
+            <a:rPr lang="en-US" sz="1600" kern="1200" dirty="0" err="1" smtClean="0"/>
+            <a:t>Initialise</a:t>
+          </a:r>
+          <a:r>
+            <a:rPr lang="en-US" sz="1600" kern="1200" dirty="0" smtClean="0"/>
+            <a:t> population</a:t>
+          </a:r>
+          <a:endParaRPr lang="en-US" sz="1600" kern="1200" dirty="0"/>
         </a:p>
       </dsp:txBody>
       <dsp:txXfrm rot="5400000">
@@ -1842,12 +1738,12 @@
         </a:fontRef>
       </dsp:style>
       <dsp:txBody>
-        <a:bodyPr spcFirstLastPara="0" vert="horz" wrap="square" lIns="95250" tIns="0" rIns="97234" bIns="0" numCol="1" spcCol="1270" anchor="t" anchorCtr="0">
+        <a:bodyPr spcFirstLastPara="0" vert="horz" wrap="square" lIns="133350" tIns="0" rIns="135558" bIns="0" numCol="1" spcCol="1270" anchor="t" anchorCtr="0">
           <a:noAutofit/>
         </a:bodyPr>
         <a:lstStyle/>
         <a:p>
-          <a:pPr lvl="0" algn="l" defTabSz="666750">
+          <a:pPr lvl="0" algn="l" defTabSz="933450">
             <a:lnSpc>
               <a:spcPct val="90000"/>
             </a:lnSpc>
@@ -1859,13 +1755,13 @@
             </a:spcAft>
           </a:pPr>
           <a:r>
-            <a:rPr lang="en-US" sz="1500" kern="1200" dirty="0" smtClean="0"/>
-            <a:t>Breed</a:t>
+            <a:rPr lang="en-US" sz="2100" kern="1200" dirty="0" smtClean="0"/>
+            <a:t>Parent selection and breeding</a:t>
           </a:r>
-          <a:endParaRPr lang="en-US" sz="1500" kern="1200" dirty="0"/>
+          <a:endParaRPr lang="en-US" sz="2100" kern="1200" dirty="0"/>
         </a:p>
         <a:p>
-          <a:pPr marL="114300" lvl="1" indent="-114300" algn="l" defTabSz="533400">
+          <a:pPr marL="171450" lvl="1" indent="-171450" algn="l" defTabSz="711200">
             <a:lnSpc>
               <a:spcPct val="90000"/>
             </a:lnSpc>
@@ -1878,12 +1774,13 @@
             <a:buChar char="••"/>
           </a:pPr>
           <a:r>
-            <a:rPr lang="en-US" sz="1200" kern="1200" dirty="0"/>
-            <a:t>Task description</a:t>
+            <a:rPr lang="en-AU" sz="1600" kern="1200" dirty="0" smtClean="0"/>
+            <a:t>Two approaches:</a:t>
           </a:r>
+          <a:endParaRPr lang="en-US" sz="1600" kern="1200" dirty="0"/>
         </a:p>
         <a:p>
-          <a:pPr marL="114300" lvl="1" indent="-114300" algn="l" defTabSz="533400">
+          <a:pPr marL="342900" lvl="2" indent="-171450" algn="l" defTabSz="711200">
             <a:lnSpc>
               <a:spcPct val="90000"/>
             </a:lnSpc>
@@ -1896,12 +1793,13 @@
             <a:buChar char="••"/>
           </a:pPr>
           <a:r>
-            <a:rPr lang="en-US" sz="1200" kern="1200" dirty="0"/>
-            <a:t>Task description</a:t>
+            <a:rPr lang="en-AU" sz="1600" kern="1200" dirty="0" smtClean="0"/>
+            <a:t>Select fittest</a:t>
           </a:r>
+          <a:endParaRPr lang="en-US" sz="1600" kern="1200" dirty="0"/>
         </a:p>
         <a:p>
-          <a:pPr marL="114300" lvl="1" indent="-114300" algn="l" defTabSz="533400">
+          <a:pPr marL="342900" lvl="2" indent="-171450" algn="l" defTabSz="711200">
             <a:lnSpc>
               <a:spcPct val="90000"/>
             </a:lnSpc>
@@ -1914,9 +1812,29 @@
             <a:buChar char="••"/>
           </a:pPr>
           <a:r>
-            <a:rPr lang="en-US" sz="1200" kern="1200" dirty="0"/>
-            <a:t>Task description</a:t>
+            <a:rPr lang="en-AU" sz="1600" kern="1200" dirty="0" smtClean="0"/>
+            <a:t>Stochastically select based on weightings</a:t>
           </a:r>
+          <a:endParaRPr lang="en-US" sz="1600" kern="1200" dirty="0"/>
+        </a:p>
+        <a:p>
+          <a:pPr marL="171450" lvl="1" indent="-171450" algn="l" defTabSz="711200">
+            <a:lnSpc>
+              <a:spcPct val="90000"/>
+            </a:lnSpc>
+            <a:spcBef>
+              <a:spcPct val="0"/>
+            </a:spcBef>
+            <a:spcAft>
+              <a:spcPct val="15000"/>
+            </a:spcAft>
+            <a:buChar char="••"/>
+          </a:pPr>
+          <a:r>
+            <a:rPr lang="en-AU" sz="1600" kern="1200" dirty="0" smtClean="0"/>
+            <a:t>Couple parents</a:t>
+          </a:r>
+          <a:endParaRPr lang="en-US" sz="1600" kern="1200" dirty="0"/>
         </a:p>
       </dsp:txBody>
       <dsp:txXfrm rot="5400000">
@@ -2002,12 +1920,12 @@
         </a:fontRef>
       </dsp:style>
       <dsp:txBody>
-        <a:bodyPr spcFirstLastPara="0" vert="horz" wrap="square" lIns="95250" tIns="0" rIns="97234" bIns="0" numCol="1" spcCol="1270" anchor="t" anchorCtr="0">
+        <a:bodyPr spcFirstLastPara="0" vert="horz" wrap="square" lIns="133350" tIns="0" rIns="135558" bIns="0" numCol="1" spcCol="1270" anchor="t" anchorCtr="0">
           <a:noAutofit/>
         </a:bodyPr>
         <a:lstStyle/>
         <a:p>
-          <a:pPr lvl="0" algn="l" defTabSz="666750">
+          <a:pPr lvl="0" algn="l" defTabSz="933450">
             <a:lnSpc>
               <a:spcPct val="90000"/>
             </a:lnSpc>
@@ -2019,17 +1937,13 @@
             </a:spcAft>
           </a:pPr>
           <a:r>
-            <a:rPr lang="en-US" sz="1500" kern="1200" dirty="0" smtClean="0"/>
-            <a:t>Add mutations/</a:t>
+            <a:rPr lang="en-US" sz="2100" kern="1200" dirty="0" smtClean="0"/>
+            <a:t>Offspring production</a:t>
           </a:r>
-          <a:r>
-            <a:rPr lang="en-US" sz="1500" kern="1200" dirty="0" err="1" smtClean="0"/>
-            <a:t>randomisation</a:t>
-          </a:r>
-          <a:endParaRPr lang="en-US" sz="1500" kern="1200" dirty="0"/>
+          <a:endParaRPr lang="en-US" sz="2100" kern="1200" dirty="0"/>
         </a:p>
         <a:p>
-          <a:pPr marL="114300" lvl="1" indent="-114300" algn="l" defTabSz="533400">
+          <a:pPr marL="171450" lvl="1" indent="-171450" algn="l" defTabSz="711200">
             <a:lnSpc>
               <a:spcPct val="90000"/>
             </a:lnSpc>
@@ -2042,27 +1956,11 @@
             <a:buChar char="••"/>
           </a:pPr>
           <a:r>
-            <a:rPr lang="en-US" sz="1200" kern="1200" dirty="0"/>
-            <a:t>Task description</a:t>
+            <a:rPr lang="en-US" sz="1600" kern="1200" dirty="0" smtClean="0"/>
+            <a:t>Crossover
+Mutation</a:t>
           </a:r>
-        </a:p>
-        <a:p>
-          <a:pPr marL="114300" lvl="1" indent="-114300" algn="l" defTabSz="533400">
-            <a:lnSpc>
-              <a:spcPct val="90000"/>
-            </a:lnSpc>
-            <a:spcBef>
-              <a:spcPct val="0"/>
-            </a:spcBef>
-            <a:spcAft>
-              <a:spcPct val="15000"/>
-            </a:spcAft>
-            <a:buChar char="••"/>
-          </a:pPr>
-          <a:r>
-            <a:rPr lang="en-US" sz="1200" kern="1200" dirty="0"/>
-            <a:t>Task description</a:t>
-          </a:r>
+          <a:endParaRPr lang="en-US" sz="1600" kern="1200" dirty="0"/>
         </a:p>
       </dsp:txBody>
       <dsp:txXfrm rot="5400000">
@@ -2148,12 +2046,12 @@
         </a:fontRef>
       </dsp:style>
       <dsp:txBody>
-        <a:bodyPr spcFirstLastPara="0" vert="horz" wrap="square" lIns="95250" tIns="0" rIns="97234" bIns="0" numCol="1" spcCol="1270" anchor="t" anchorCtr="0">
+        <a:bodyPr spcFirstLastPara="0" vert="horz" wrap="square" lIns="133350" tIns="0" rIns="135558" bIns="0" numCol="1" spcCol="1270" anchor="t" anchorCtr="0">
           <a:noAutofit/>
         </a:bodyPr>
         <a:lstStyle/>
         <a:p>
-          <a:pPr lvl="0" algn="l" defTabSz="666750">
+          <a:pPr lvl="0" algn="l" defTabSz="933450">
             <a:lnSpc>
               <a:spcPct val="90000"/>
             </a:lnSpc>
@@ -2165,13 +2063,13 @@
             </a:spcAft>
           </a:pPr>
           <a:r>
-            <a:rPr lang="en-US" sz="1500" kern="1200" dirty="0" smtClean="0"/>
-            <a:t>Output predicted values?</a:t>
+            <a:rPr lang="en-US" sz="2100" kern="1200" dirty="0" smtClean="0"/>
+            <a:t>Application of Fitness</a:t>
           </a:r>
-          <a:endParaRPr lang="en-US" sz="1500" kern="1200" dirty="0"/>
+          <a:endParaRPr lang="en-US" sz="2100" kern="1200" dirty="0"/>
         </a:p>
         <a:p>
-          <a:pPr marL="114300" lvl="1" indent="-114300" algn="l" defTabSz="533400">
+          <a:pPr marL="171450" lvl="1" indent="-171450" algn="l" defTabSz="711200">
             <a:lnSpc>
               <a:spcPct val="90000"/>
             </a:lnSpc>
@@ -2184,12 +2082,14 @@
             <a:buChar char="••"/>
           </a:pPr>
           <a:r>
-            <a:rPr lang="en-US" sz="1200" kern="1200" dirty="0"/>
-            <a:t>Task description</a:t>
+            <a:rPr lang="en-AU" sz="1600" kern="1200" dirty="0" smtClean="0"/>
+            <a:t>Cull weakest chromosomes in selection of next generation
+Continue evolution with next generation</a:t>
           </a:r>
+          <a:endParaRPr lang="en-US" sz="1600" kern="1200" dirty="0"/>
         </a:p>
         <a:p>
-          <a:pPr marL="114300" lvl="1" indent="-114300" algn="l" defTabSz="533400">
+          <a:pPr marL="171450" lvl="1" indent="-171450" algn="l" defTabSz="711200">
             <a:lnSpc>
               <a:spcPct val="90000"/>
             </a:lnSpc>
@@ -2202,9 +2102,10 @@
             <a:buChar char="••"/>
           </a:pPr>
           <a:r>
-            <a:rPr lang="en-US" sz="1200" kern="1200" dirty="0"/>
-            <a:t>Task description</a:t>
+            <a:rPr lang="en-US" sz="1600" kern="1200" dirty="0" smtClean="0"/>
+            <a:t>Track progress</a:t>
           </a:r>
+          <a:endParaRPr lang="en-US" sz="1600" kern="1200" dirty="0"/>
         </a:p>
       </dsp:txBody>
       <dsp:txXfrm rot="5400000">
@@ -3530,7 +3431,7 @@
           <a:p>
             <a:fld id="{CEEBDA6D-DC69-4DCE-BAF7-6763517D3376}" type="datetimeFigureOut">
               <a:rPr lang="en-US"/>
-              <a:t>9/15/2018</a:t>
+              <a:t>9/16/2018</a:t>
             </a:fld>
             <a:endParaRPr/>
           </a:p>
@@ -3695,7 +3596,7 @@
           <a:p>
             <a:fld id="{237F6C43-988E-4257-9A1C-C162EF036D58}" type="datetimeFigureOut">
               <a:rPr lang="en-US"/>
-              <a:t>9/15/2018</a:t>
+              <a:t>9/16/2018</a:t>
             </a:fld>
             <a:endParaRPr/>
           </a:p>
@@ -4218,7 +4119,7 @@
             <a:fld id="{2CCFE9AC-F15C-4FA0-A6F1-298829FA691D}" type="datetimeFigureOut">
               <a:rPr lang="en-US" smtClean="0"/>
               <a:pPr/>
-              <a:t>9/15/2018</a:t>
+              <a:t>9/16/2018</a:t>
             </a:fld>
             <a:endParaRPr lang="en-US" dirty="0"/>
           </a:p>
@@ -4417,7 +4318,7 @@
           <a:p>
             <a:fld id="{2CCFE9AC-F15C-4FA0-A6F1-298829FA691D}" type="datetimeFigureOut">
               <a:rPr lang="en-US"/>
-              <a:t>9/15/2018</a:t>
+              <a:t>9/16/2018</a:t>
             </a:fld>
             <a:endParaRPr/>
           </a:p>
@@ -4687,7 +4588,7 @@
           <a:p>
             <a:fld id="{2CCFE9AC-F15C-4FA0-A6F1-298829FA691D}" type="datetimeFigureOut">
               <a:rPr lang="en-US"/>
-              <a:t>9/15/2018</a:t>
+              <a:t>9/16/2018</a:t>
             </a:fld>
             <a:endParaRPr/>
           </a:p>
@@ -4879,7 +4780,7 @@
           <a:p>
             <a:fld id="{2CCFE9AC-F15C-4FA0-A6F1-298829FA691D}" type="datetimeFigureOut">
               <a:rPr lang="en-US"/>
-              <a:t>9/15/2018</a:t>
+              <a:t>9/16/2018</a:t>
             </a:fld>
             <a:endParaRPr/>
           </a:p>
@@ -5262,7 +5163,7 @@
             <a:fld id="{2CCFE9AC-F15C-4FA0-A6F1-298829FA691D}" type="datetimeFigureOut">
               <a:rPr lang="en-US" smtClean="0"/>
               <a:pPr/>
-              <a:t>9/15/2018</a:t>
+              <a:t>9/16/2018</a:t>
             </a:fld>
             <a:endParaRPr lang="en-US"/>
           </a:p>
@@ -5523,7 +5424,7 @@
           <a:p>
             <a:fld id="{2CCFE9AC-F15C-4FA0-A6F1-298829FA691D}" type="datetimeFigureOut">
               <a:rPr lang="en-US"/>
-              <a:t>9/15/2018</a:t>
+              <a:t>9/16/2018</a:t>
             </a:fld>
             <a:endParaRPr/>
           </a:p>
@@ -5897,7 +5798,7 @@
           <a:p>
             <a:fld id="{2CCFE9AC-F15C-4FA0-A6F1-298829FA691D}" type="datetimeFigureOut">
               <a:rPr lang="en-US"/>
-              <a:t>9/15/2018</a:t>
+              <a:t>9/16/2018</a:t>
             </a:fld>
             <a:endParaRPr/>
           </a:p>
@@ -6027,7 +5928,7 @@
           <a:p>
             <a:fld id="{2CCFE9AC-F15C-4FA0-A6F1-298829FA691D}" type="datetimeFigureOut">
               <a:rPr lang="en-US"/>
-              <a:t>9/15/2018</a:t>
+              <a:t>9/16/2018</a:t>
             </a:fld>
             <a:endParaRPr/>
           </a:p>
@@ -6134,7 +6035,7 @@
           <a:p>
             <a:fld id="{2CCFE9AC-F15C-4FA0-A6F1-298829FA691D}" type="datetimeFigureOut">
               <a:rPr lang="en-US"/>
-              <a:t>9/15/2018</a:t>
+              <a:t>9/16/2018</a:t>
             </a:fld>
             <a:endParaRPr/>
           </a:p>
@@ -6427,7 +6328,7 @@
           <a:p>
             <a:fld id="{2CCFE9AC-F15C-4FA0-A6F1-298829FA691D}" type="datetimeFigureOut">
               <a:rPr lang="en-US"/>
-              <a:t>9/15/2018</a:t>
+              <a:t>9/16/2018</a:t>
             </a:fld>
             <a:endParaRPr/>
           </a:p>
@@ -6697,7 +6598,7 @@
           <a:p>
             <a:fld id="{2CCFE9AC-F15C-4FA0-A6F1-298829FA691D}" type="datetimeFigureOut">
               <a:rPr lang="en-US"/>
-              <a:t>9/15/2018</a:t>
+              <a:t>9/16/2018</a:t>
             </a:fld>
             <a:endParaRPr/>
           </a:p>
@@ -6994,7 +6895,7 @@
             <a:fld id="{2CCFE9AC-F15C-4FA0-A6F1-298829FA691D}" type="datetimeFigureOut">
               <a:rPr lang="en-US" smtClean="0"/>
               <a:pPr/>
-              <a:t>9/15/2018</a:t>
+              <a:t>9/16/2018</a:t>
             </a:fld>
             <a:endParaRPr lang="en-US" dirty="0"/>
           </a:p>
@@ -7545,6 +7446,484 @@
           <a:p>
             <a:r>
               <a:rPr lang="en-US" dirty="0" smtClean="0"/>
+              <a:t>Code snippets – 3</a:t>
+            </a:r>
+            <a:endParaRPr lang="en-US" dirty="0"/>
+          </a:p>
+        </p:txBody>
+      </p:sp>
+      <p:pic>
+        <p:nvPicPr>
+          <p:cNvPr id="3" name="Picture 2"/>
+          <p:cNvPicPr>
+            <a:picLocks noChangeAspect="1"/>
+          </p:cNvPicPr>
+          <p:nvPr/>
+        </p:nvPicPr>
+        <p:blipFill>
+          <a:blip r:embed="rId2"/>
+          <a:stretch>
+            <a:fillRect/>
+          </a:stretch>
+        </p:blipFill>
+        <p:spPr>
+          <a:xfrm>
+            <a:off x="674751" y="2219325"/>
+            <a:ext cx="10839450" cy="4038600"/>
+          </a:xfrm>
+          <a:prstGeom prst="rect">
+            <a:avLst/>
+          </a:prstGeom>
+        </p:spPr>
+      </p:pic>
+    </p:spTree>
+    <p:extLst>
+      <p:ext uri="{BB962C8B-B14F-4D97-AF65-F5344CB8AC3E}">
+        <p14:creationId xmlns:p14="http://schemas.microsoft.com/office/powerpoint/2010/main" val="599145216"/>
+      </p:ext>
+    </p:extLst>
+  </p:cSld>
+  <p:clrMapOvr>
+    <a:masterClrMapping/>
+  </p:clrMapOvr>
+  <mc:AlternateContent xmlns:mc="http://schemas.openxmlformats.org/markup-compatibility/2006" xmlns:p14="http://schemas.microsoft.com/office/powerpoint/2010/main">
+    <mc:Choice Requires="p14">
+      <p:transition spd="med" p14:dur="700">
+        <p:fade/>
+      </p:transition>
+    </mc:Choice>
+    <mc:Fallback xmlns="">
+      <p:transition spd="med">
+        <p:fade/>
+      </p:transition>
+    </mc:Fallback>
+  </mc:AlternateContent>
+</p:sld>
+</file>
+
+<file path=ppt/slides/slide11.xml><?xml version="1.0" encoding="utf-8"?>
+<p:sld xmlns:a="http://schemas.openxmlformats.org/drawingml/2006/main" xmlns:r="http://schemas.openxmlformats.org/officeDocument/2006/relationships" xmlns:p="http://schemas.openxmlformats.org/presentationml/2006/main">
+  <p:cSld>
+    <p:spTree>
+      <p:nvGrpSpPr>
+        <p:cNvPr id="1" name=""/>
+        <p:cNvGrpSpPr/>
+        <p:nvPr/>
+      </p:nvGrpSpPr>
+      <p:grpSpPr>
+        <a:xfrm>
+          <a:off x="0" y="0"/>
+          <a:ext cx="0" cy="0"/>
+          <a:chOff x="0" y="0"/>
+          <a:chExt cx="0" cy="0"/>
+        </a:xfrm>
+      </p:grpSpPr>
+      <p:sp>
+        <p:nvSpPr>
+          <p:cNvPr id="2" name="Title 1"/>
+          <p:cNvSpPr>
+            <a:spLocks noGrp="1"/>
+          </p:cNvSpPr>
+          <p:nvPr>
+            <p:ph type="title"/>
+          </p:nvPr>
+        </p:nvSpPr>
+        <p:spPr/>
+        <p:txBody>
+          <a:bodyPr/>
+          <a:lstStyle/>
+          <a:p>
+            <a:r>
+              <a:rPr lang="en-AU" dirty="0" smtClean="0"/>
+              <a:t>Limitations and constraints</a:t>
+            </a:r>
+            <a:endParaRPr lang="en-AU" dirty="0"/>
+          </a:p>
+        </p:txBody>
+      </p:sp>
+      <p:sp>
+        <p:nvSpPr>
+          <p:cNvPr id="3" name="Rectangle 2"/>
+          <p:cNvSpPr/>
+          <p:nvPr/>
+        </p:nvSpPr>
+        <p:spPr>
+          <a:xfrm>
+            <a:off x="1280160" y="2690336"/>
+            <a:ext cx="7789025" cy="2308324"/>
+          </a:xfrm>
+          <a:prstGeom prst="rect">
+            <a:avLst/>
+          </a:prstGeom>
+        </p:spPr>
+        <p:txBody>
+          <a:bodyPr wrap="square">
+            <a:spAutoFit/>
+          </a:bodyPr>
+          <a:lstStyle/>
+          <a:p>
+            <a:pPr marL="285750" indent="-285750">
+              <a:buFont typeface="Wingdings" panose="05000000000000000000" pitchFamily="2" charset="2"/>
+              <a:buChar char="§"/>
+            </a:pPr>
+            <a:r>
+              <a:rPr lang="en-AU" dirty="0"/>
+              <a:t>P</a:t>
+            </a:r>
+            <a:r>
+              <a:rPr lang="en-AU" dirty="0" smtClean="0"/>
+              <a:t>rediction accuracy is modest</a:t>
+            </a:r>
+          </a:p>
+          <a:p>
+            <a:pPr marL="285750" indent="-285750">
+              <a:buFont typeface="Wingdings" panose="05000000000000000000" pitchFamily="2" charset="2"/>
+              <a:buChar char="§"/>
+            </a:pPr>
+            <a:endParaRPr lang="en-AU" dirty="0" smtClean="0"/>
+          </a:p>
+          <a:p>
+            <a:pPr marL="285750" indent="-285750">
+              <a:buFont typeface="Wingdings" panose="05000000000000000000" pitchFamily="2" charset="2"/>
+              <a:buChar char="§"/>
+            </a:pPr>
+            <a:r>
+              <a:rPr lang="en-AU" dirty="0"/>
+              <a:t>L</a:t>
+            </a:r>
+            <a:r>
+              <a:rPr lang="en-AU" dirty="0" smtClean="0"/>
+              <a:t>inear </a:t>
+            </a:r>
+            <a:r>
+              <a:rPr lang="en-AU" dirty="0"/>
+              <a:t>equation may not be the best suited prediction model for the </a:t>
+            </a:r>
+            <a:r>
+              <a:rPr lang="en-AU" dirty="0" smtClean="0"/>
+              <a:t>problem</a:t>
+            </a:r>
+          </a:p>
+          <a:p>
+            <a:pPr marL="285750" indent="-285750">
+              <a:buFont typeface="Wingdings" panose="05000000000000000000" pitchFamily="2" charset="2"/>
+              <a:buChar char="§"/>
+            </a:pPr>
+            <a:endParaRPr lang="en-AU" dirty="0"/>
+          </a:p>
+          <a:p>
+            <a:pPr marL="285750" indent="-285750">
+              <a:buFont typeface="Wingdings" panose="05000000000000000000" pitchFamily="2" charset="2"/>
+              <a:buChar char="§"/>
+            </a:pPr>
+            <a:r>
+              <a:rPr lang="en-AU" dirty="0"/>
+              <a:t>N</a:t>
+            </a:r>
+            <a:r>
+              <a:rPr lang="en-AU" dirty="0" smtClean="0"/>
+              <a:t>o </a:t>
+            </a:r>
+            <a:r>
+              <a:rPr lang="en-AU" dirty="0"/>
+              <a:t>automatic stopping; # of generations is a </a:t>
+            </a:r>
+            <a:r>
+              <a:rPr lang="en-AU" dirty="0" smtClean="0"/>
+              <a:t>hyperparameter</a:t>
+            </a:r>
+          </a:p>
+          <a:p>
+            <a:pPr marL="285750" indent="-285750">
+              <a:buFont typeface="Wingdings" panose="05000000000000000000" pitchFamily="2" charset="2"/>
+              <a:buChar char="§"/>
+            </a:pPr>
+            <a:endParaRPr lang="en-AU" dirty="0" smtClean="0"/>
+          </a:p>
+          <a:p>
+            <a:pPr marL="285750" indent="-285750">
+              <a:buFont typeface="Wingdings" panose="05000000000000000000" pitchFamily="2" charset="2"/>
+              <a:buChar char="§"/>
+            </a:pPr>
+            <a:r>
+              <a:rPr lang="en-AU" dirty="0"/>
+              <a:t>G</a:t>
+            </a:r>
+            <a:r>
+              <a:rPr lang="en-AU" dirty="0" smtClean="0"/>
+              <a:t>ridsearch </a:t>
+            </a:r>
+            <a:r>
+              <a:rPr lang="en-AU" dirty="0"/>
+              <a:t>over the whole hyperparameter space is computationally expensive</a:t>
+            </a:r>
+          </a:p>
+        </p:txBody>
+      </p:sp>
+    </p:spTree>
+    <p:extLst>
+      <p:ext uri="{BB962C8B-B14F-4D97-AF65-F5344CB8AC3E}">
+        <p14:creationId xmlns:p14="http://schemas.microsoft.com/office/powerpoint/2010/main" val="1378578984"/>
+      </p:ext>
+    </p:extLst>
+  </p:cSld>
+  <p:clrMapOvr>
+    <a:masterClrMapping/>
+  </p:clrMapOvr>
+  <mc:AlternateContent xmlns:mc="http://schemas.openxmlformats.org/markup-compatibility/2006" xmlns:p14="http://schemas.microsoft.com/office/powerpoint/2010/main">
+    <mc:Choice Requires="p14">
+      <p:transition spd="med" p14:dur="700">
+        <p:fade/>
+      </p:transition>
+    </mc:Choice>
+    <mc:Fallback xmlns="">
+      <p:transition spd="med">
+        <p:fade/>
+      </p:transition>
+    </mc:Fallback>
+  </mc:AlternateContent>
+</p:sld>
+</file>
+
+<file path=ppt/slides/slide12.xml><?xml version="1.0" encoding="utf-8"?>
+<p:sld xmlns:a="http://schemas.openxmlformats.org/drawingml/2006/main" xmlns:r="http://schemas.openxmlformats.org/officeDocument/2006/relationships" xmlns:p="http://schemas.openxmlformats.org/presentationml/2006/main">
+  <p:cSld>
+    <p:spTree>
+      <p:nvGrpSpPr>
+        <p:cNvPr id="1" name=""/>
+        <p:cNvGrpSpPr/>
+        <p:nvPr/>
+      </p:nvGrpSpPr>
+      <p:grpSpPr>
+        <a:xfrm>
+          <a:off x="0" y="0"/>
+          <a:ext cx="0" cy="0"/>
+          <a:chOff x="0" y="0"/>
+          <a:chExt cx="0" cy="0"/>
+        </a:xfrm>
+      </p:grpSpPr>
+      <p:sp>
+        <p:nvSpPr>
+          <p:cNvPr id="2" name="Title 1"/>
+          <p:cNvSpPr>
+            <a:spLocks noGrp="1"/>
+          </p:cNvSpPr>
+          <p:nvPr>
+            <p:ph type="title"/>
+          </p:nvPr>
+        </p:nvSpPr>
+        <p:spPr/>
+        <p:txBody>
+          <a:bodyPr/>
+          <a:lstStyle/>
+          <a:p>
+            <a:r>
+              <a:rPr lang="en-AU" dirty="0" smtClean="0"/>
+              <a:t>References</a:t>
+            </a:r>
+            <a:endParaRPr lang="en-AU" dirty="0"/>
+          </a:p>
+        </p:txBody>
+      </p:sp>
+      <p:sp>
+        <p:nvSpPr>
+          <p:cNvPr id="3" name="Text Placeholder 2"/>
+          <p:cNvSpPr>
+            <a:spLocks noGrp="1"/>
+          </p:cNvSpPr>
+          <p:nvPr>
+            <p:ph type="body" sz="half" idx="2"/>
+          </p:nvPr>
+        </p:nvSpPr>
+        <p:spPr>
+          <a:xfrm>
+            <a:off x="1291818" y="2465294"/>
+            <a:ext cx="9616974" cy="3711669"/>
+          </a:xfrm>
+        </p:spPr>
+        <p:txBody>
+          <a:bodyPr>
+            <a:normAutofit lnSpcReduction="10000"/>
+          </a:bodyPr>
+          <a:lstStyle/>
+          <a:p>
+            <a:r>
+              <a:rPr lang="en-AU" sz="2000" b="1" dirty="0" smtClean="0"/>
+              <a:t>[1] - </a:t>
+            </a:r>
+            <a:r>
+              <a:rPr lang="en-AU" sz="1900" dirty="0" err="1" smtClean="0"/>
+              <a:t>Carr</a:t>
+            </a:r>
+            <a:r>
+              <a:rPr lang="en-AU" sz="1900" dirty="0"/>
+              <a:t>, J. (2014). </a:t>
+            </a:r>
+            <a:r>
+              <a:rPr lang="en-AU" sz="1900" i="1" dirty="0"/>
+              <a:t>An Introduction to Genetic Algorithms</a:t>
+            </a:r>
+            <a:r>
+              <a:rPr lang="en-AU" sz="1900" dirty="0"/>
+              <a:t>. [online] Whitman.edu. Available at: https://www.whitman.edu/Documents/Academics/Mathematics/2014/carrjk.pdf [Accessed 10 Sep. 2018</a:t>
+            </a:r>
+            <a:r>
+              <a:rPr lang="en-AU" sz="1900" dirty="0" smtClean="0"/>
+              <a:t>].</a:t>
+            </a:r>
+            <a:endParaRPr lang="en-AU" sz="1900" dirty="0"/>
+          </a:p>
+          <a:p>
+            <a:r>
+              <a:rPr lang="en-AU" sz="2000" b="1" dirty="0" smtClean="0"/>
+              <a:t>[2] - </a:t>
+            </a:r>
+            <a:r>
+              <a:rPr lang="en-AU" sz="1900" dirty="0" err="1" smtClean="0"/>
+              <a:t>Bodenhofer</a:t>
+            </a:r>
+            <a:r>
+              <a:rPr lang="en-AU" sz="1900" dirty="0"/>
+              <a:t>, U. (2003). </a:t>
+            </a:r>
+            <a:r>
+              <a:rPr lang="en-AU" sz="1900" i="1" dirty="0"/>
+              <a:t>Genetic Algorithms: Theory and Applications</a:t>
+            </a:r>
+            <a:r>
+              <a:rPr lang="en-AU" sz="1900" dirty="0"/>
+              <a:t>. [online] Flll.jku.at. Available at: http://www.flll.jku.at/div/teaching/Ga/GA-Notes.pdf [Accessed </a:t>
+            </a:r>
+            <a:r>
+              <a:rPr lang="en-AU" sz="1900" dirty="0" smtClean="0"/>
+              <a:t>10 </a:t>
+            </a:r>
+            <a:r>
+              <a:rPr lang="en-AU" sz="1900" dirty="0"/>
+              <a:t>Sep. 2018</a:t>
+            </a:r>
+            <a:r>
+              <a:rPr lang="en-AU" sz="1900" dirty="0" smtClean="0"/>
+              <a:t>].</a:t>
+            </a:r>
+          </a:p>
+          <a:p>
+            <a:r>
+              <a:rPr lang="en-AU" sz="2000" b="1" dirty="0" smtClean="0"/>
+              <a:t>[3] - </a:t>
+            </a:r>
+            <a:r>
+              <a:rPr lang="en-AU" sz="1900" dirty="0" smtClean="0"/>
+              <a:t>Nicolle</a:t>
+            </a:r>
+            <a:r>
+              <a:rPr lang="en-AU" sz="1900" dirty="0"/>
+              <a:t>, L. (2017). </a:t>
+            </a:r>
+            <a:r>
+              <a:rPr lang="en-AU" sz="1900" i="1" dirty="0"/>
+              <a:t>Getting started with genetic algorithms: a tutorial</a:t>
+            </a:r>
+            <a:r>
+              <a:rPr lang="en-AU" sz="1900" dirty="0"/>
+              <a:t>. [online] </a:t>
+            </a:r>
+            <a:r>
+              <a:rPr lang="en-AU" sz="1900" dirty="0" err="1"/>
+              <a:t>Sicara's</a:t>
+            </a:r>
+            <a:r>
+              <a:rPr lang="en-AU" sz="1900" dirty="0"/>
+              <a:t> blog. Available at: https://blog.sicara.com/getting-started-genetic-algorithms-python-tutorial-81ffa1dd72f9 [Accessed 10 Sep. 2018</a:t>
+            </a:r>
+            <a:r>
+              <a:rPr lang="en-AU" sz="1900" dirty="0" smtClean="0"/>
+              <a:t>].</a:t>
+            </a:r>
+          </a:p>
+          <a:p>
+            <a:r>
+              <a:rPr lang="en-AU" sz="2000" b="1" dirty="0" smtClean="0"/>
+              <a:t>[4] - </a:t>
+            </a:r>
+            <a:r>
+              <a:rPr lang="en-AU" sz="1900" dirty="0"/>
+              <a:t>Bailey, B. (2017). </a:t>
+            </a:r>
+            <a:r>
+              <a:rPr lang="en-AU" sz="1900" i="1" dirty="0"/>
+              <a:t>Data Cleaning 101 – Towards Data Science</a:t>
+            </a:r>
+            <a:r>
+              <a:rPr lang="en-AU" sz="1900" dirty="0"/>
+              <a:t>. [online] Towards Data Science. Available at: https://towardsdatascience.com/data-cleaning-101-948d22a92e4 [Accessed 15 Sep. 2018].</a:t>
+            </a:r>
+            <a:endParaRPr lang="en-AU" sz="1900" dirty="0" smtClean="0"/>
+          </a:p>
+          <a:p>
+            <a:endParaRPr lang="en-AU" dirty="0"/>
+          </a:p>
+        </p:txBody>
+      </p:sp>
+    </p:spTree>
+    <p:extLst>
+      <p:ext uri="{BB962C8B-B14F-4D97-AF65-F5344CB8AC3E}">
+        <p14:creationId xmlns:p14="http://schemas.microsoft.com/office/powerpoint/2010/main" val="2831923469"/>
+      </p:ext>
+    </p:extLst>
+  </p:cSld>
+  <p:clrMapOvr>
+    <a:masterClrMapping/>
+  </p:clrMapOvr>
+  <mc:AlternateContent xmlns:mc="http://schemas.openxmlformats.org/markup-compatibility/2006" xmlns:p14="http://schemas.microsoft.com/office/powerpoint/2010/main">
+    <mc:Choice Requires="p14">
+      <p:transition spd="med" p14:dur="700">
+        <p:fade/>
+      </p:transition>
+    </mc:Choice>
+    <mc:Fallback xmlns="">
+      <p:transition spd="med">
+        <p:fade/>
+      </p:transition>
+    </mc:Fallback>
+  </mc:AlternateContent>
+</p:sld>
+</file>
+
+<file path=ppt/slides/slide13.xml><?xml version="1.0" encoding="utf-8"?>
+<p:sld xmlns:a="http://schemas.openxmlformats.org/drawingml/2006/main" xmlns:r="http://schemas.openxmlformats.org/officeDocument/2006/relationships" xmlns:p="http://schemas.openxmlformats.org/presentationml/2006/main">
+  <p:cSld>
+    <p:spTree>
+      <p:nvGrpSpPr>
+        <p:cNvPr id="1" name=""/>
+        <p:cNvGrpSpPr/>
+        <p:nvPr/>
+      </p:nvGrpSpPr>
+      <p:grpSpPr>
+        <a:xfrm>
+          <a:off x="0" y="0"/>
+          <a:ext cx="0" cy="0"/>
+          <a:chOff x="0" y="0"/>
+          <a:chExt cx="0" cy="0"/>
+        </a:xfrm>
+      </p:grpSpPr>
+      <p:sp>
+        <p:nvSpPr>
+          <p:cNvPr id="2" name="Title 1"/>
+          <p:cNvSpPr>
+            <a:spLocks noGrp="1"/>
+          </p:cNvSpPr>
+          <p:nvPr>
+            <p:ph type="title"/>
+          </p:nvPr>
+        </p:nvSpPr>
+        <p:spPr/>
+        <p:txBody>
+          <a:bodyPr/>
+          <a:lstStyle/>
+          <a:p>
+            <a:r>
+              <a:rPr lang="en-US" dirty="0" smtClean="0"/>
               <a:t>Conclusion</a:t>
             </a:r>
             <a:endParaRPr lang="en-US" dirty="0"/>
@@ -7560,7 +7939,7 @@
         <p:spPr>
           <a:xfrm>
             <a:off x="1312925" y="2457451"/>
-            <a:ext cx="9563101" cy="2492990"/>
+            <a:ext cx="9563101" cy="2739211"/>
           </a:xfrm>
           <a:prstGeom prst="rect">
             <a:avLst/>
@@ -7573,25 +7952,32 @@
           <a:lstStyle/>
           <a:p>
             <a:r>
-              <a:rPr lang="en-US" sz="4000" dirty="0"/>
+              <a:rPr lang="en-US" sz="3600" dirty="0"/>
               <a:t>Repository for the program and related documents is located here: </a:t>
             </a:r>
           </a:p>
           <a:p>
-            <a:endParaRPr lang="en-US" sz="4000" dirty="0"/>
-          </a:p>
-          <a:p>
-            <a:r>
-              <a:rPr lang="en-US" sz="3600" dirty="0">
+            <a:r>
+              <a:rPr lang="en-US" sz="3200" dirty="0">
                 <a:hlinkClick r:id="rId2"/>
               </a:rPr>
               <a:t>https://</a:t>
             </a:r>
             <a:r>
-              <a:rPr lang="en-US" sz="3600" dirty="0" smtClean="0">
+              <a:rPr lang="en-US" sz="3200" dirty="0" smtClean="0">
                 <a:hlinkClick r:id="rId2"/>
               </a:rPr>
               <a:t>github.com/PhilipCastiglione/SIT215_PBL4</a:t>
+            </a:r>
+            <a:endParaRPr lang="en-US" sz="3200" dirty="0" smtClean="0"/>
+          </a:p>
+          <a:p>
+            <a:endParaRPr lang="en-US" sz="3200" dirty="0"/>
+          </a:p>
+          <a:p>
+            <a:r>
+              <a:rPr lang="en-US" sz="3200" dirty="0" smtClean="0"/>
+              <a:t>Thanks for watching!</a:t>
             </a:r>
             <a:r>
               <a:rPr lang="en-US" sz="3600" dirty="0" smtClean="0"/>
@@ -7678,26 +8064,50 @@
         </p:nvSpPr>
         <p:spPr/>
         <p:txBody>
-          <a:bodyPr/>
+          <a:bodyPr>
+            <a:normAutofit/>
+          </a:bodyPr>
           <a:lstStyle/>
           <a:p>
             <a:r>
-              <a:rPr lang="en-US"/>
-              <a:t>Add your first bullet point here</a:t>
-            </a:r>
-          </a:p>
-          <a:p>
-            <a:r>
-              <a:rPr lang="en-US"/>
-              <a:t>Add your second bullet point here</a:t>
-            </a:r>
-          </a:p>
-          <a:p>
-            <a:r>
-              <a:rPr lang="en-US"/>
-              <a:t>Add your third bullet point here</a:t>
-            </a:r>
-            <a:endParaRPr lang="en-US" dirty="0"/>
+              <a:rPr lang="en-US" sz="2800" dirty="0" smtClean="0"/>
+              <a:t>Optimisation technique based off evolutionary natural selection</a:t>
+            </a:r>
+            <a:endParaRPr lang="en-US" sz="2800" dirty="0"/>
+          </a:p>
+          <a:p>
+            <a:r>
+              <a:rPr lang="en-US" sz="2800" dirty="0" smtClean="0"/>
+              <a:t>Map data to a genome comprised of chromosomes </a:t>
+            </a:r>
+          </a:p>
+          <a:p>
+            <a:r>
+              <a:rPr lang="en-AU" sz="2800"/>
+              <a:t>Breed a new generation using the best chromosomes of the previous </a:t>
+            </a:r>
+            <a:r>
+              <a:rPr lang="en-AU" sz="2800" smtClean="0"/>
+              <a:t>generation</a:t>
+            </a:r>
+          </a:p>
+          <a:p>
+            <a:r>
+              <a:rPr lang="en-US" sz="2800" smtClean="0"/>
+              <a:t>Uses </a:t>
+            </a:r>
+            <a:r>
+              <a:rPr lang="en-US" sz="2800" dirty="0" smtClean="0"/>
+              <a:t>mutation, crossover and selection in new generations to </a:t>
+            </a:r>
+            <a:r>
+              <a:rPr lang="en-AU" sz="2800" dirty="0" smtClean="0"/>
+              <a:t>stochastically </a:t>
+            </a:r>
+            <a:r>
+              <a:rPr lang="en-AU" sz="2800" dirty="0"/>
+              <a:t>improve fitness across the population of solutions</a:t>
+            </a:r>
           </a:p>
         </p:txBody>
       </p:sp>
@@ -7783,14 +8193,14 @@
             <p:ph sz="half" idx="2"/>
             <p:extLst>
               <p:ext uri="{D42A27DB-BD31-4B8C-83A1-F6EECF244321}">
-                <p14:modId xmlns:p14="http://schemas.microsoft.com/office/powerpoint/2010/main" val="3877589872"/>
+                <p14:modId xmlns:p14="http://schemas.microsoft.com/office/powerpoint/2010/main" val="1671480080"/>
               </p:ext>
             </p:extLst>
           </p:nvPr>
         </p:nvGraphicFramePr>
         <p:xfrm>
-          <a:off x="1279650" y="1895302"/>
-          <a:ext cx="9629142" cy="4687773"/>
+          <a:off x="1081213" y="1904827"/>
+          <a:ext cx="10026525" cy="4667417"/>
         </p:xfrm>
         <a:graphic>
           <a:graphicData uri="http://schemas.openxmlformats.org/drawingml/2006/table">
@@ -7799,21 +8209,21 @@
                 <a:tableStyleId>{3B4B98B0-60AC-42C2-AFA5-B58CD77FA1E5}</a:tableStyleId>
               </a:tblPr>
               <a:tblGrid>
-                <a:gridCol w="3209714">
+                <a:gridCol w="3342175">
                   <a:extLst>
                     <a:ext uri="{9D8B030D-6E8A-4147-A177-3AD203B41FA5}">
                       <a16:colId xmlns:a16="http://schemas.microsoft.com/office/drawing/2014/main" val="20000"/>
                     </a:ext>
                   </a:extLst>
                 </a:gridCol>
-                <a:gridCol w="3209714">
+                <a:gridCol w="3342175">
                   <a:extLst>
                     <a:ext uri="{9D8B030D-6E8A-4147-A177-3AD203B41FA5}">
                       <a16:colId xmlns:a16="http://schemas.microsoft.com/office/drawing/2014/main" val="20001"/>
                     </a:ext>
                   </a:extLst>
                 </a:gridCol>
-                <a:gridCol w="3209714">
+                <a:gridCol w="3342175">
                   <a:extLst>
                     <a:ext uri="{9D8B030D-6E8A-4147-A177-3AD203B41FA5}">
                       <a16:colId xmlns:a16="http://schemas.microsoft.com/office/drawing/2014/main" val="20002"/>
@@ -7891,13 +8301,8 @@
                     <a:p>
                       <a:r>
                         <a:rPr lang="en-AU" sz="1600" dirty="0" smtClean="0"/>
-                        <a:t>Problem Domain</a:t>
+                        <a:t>Problem Domain: Optimisation</a:t>
                       </a:r>
-                      <a:r>
-                        <a:rPr lang="en-AU" sz="1600" dirty="0" smtClean="0"/>
-                        <a:t>: ???</a:t>
-                      </a:r>
-                      <a:endParaRPr lang="en-AU" sz="1600" dirty="0" smtClean="0"/>
                     </a:p>
                   </a:txBody>
                   <a:tcPr anchor="ctr"/>
@@ -7910,11 +8315,7 @@
                       <a:pPr algn="l"/>
                       <a:r>
                         <a:rPr lang="en-AU" sz="1600" dirty="0" smtClean="0"/>
-                        <a:t>Lee: </a:t>
-                      </a:r>
-                      <a:r>
-                        <a:rPr lang="en-AU" sz="1600" dirty="0" smtClean="0"/>
-                        <a:t>Basic</a:t>
+                        <a:t>Lee: Basic</a:t>
                       </a:r>
                     </a:p>
                     <a:p>
@@ -7933,12 +8334,29 @@
                     <a:bodyPr/>
                     <a:lstStyle/>
                     <a:p>
-                      <a:pPr algn="ctr"/>
+                      <a:pPr algn="l"/>
                       <a:r>
                         <a:rPr lang="en-AU" sz="1100" dirty="0" smtClean="0"/>
-                        <a:t>???</a:t>
+                        <a:t>Introduction to Genetic Algorithms</a:t>
                       </a:r>
-                      <a:endParaRPr sz="1100" dirty="0"/>
+                    </a:p>
+                    <a:p>
+                      <a:pPr algn="l"/>
+                      <a:r>
+                        <a:rPr lang="en-AU" sz="1100" dirty="0" smtClean="0">
+                          <a:hlinkClick r:id="rId2"/>
+                        </a:rPr>
+                        <a:t>https://www.whitman.edu/Documents/Academics/Mathematics/2014/carrjk.pdf</a:t>
+                      </a:r>
+                      <a:r>
+                        <a:rPr lang="en-AU" sz="1100" dirty="0" smtClean="0"/>
+                        <a:t> </a:t>
+                      </a:r>
+                      <a:r>
+                        <a:rPr lang="en-AU" sz="1100" baseline="30000" dirty="0" smtClean="0"/>
+                        <a:t>[1]</a:t>
+                      </a:r>
+                      <a:endParaRPr sz="1100" baseline="30000" dirty="0"/>
                     </a:p>
                   </a:txBody>
                   <a:tcPr anchor="ctr"/>
@@ -7957,7 +8375,7 @@
                     <a:p>
                       <a:r>
                         <a:rPr lang="en-AU" sz="1600" dirty="0" smtClean="0"/>
-                        <a:t>Finding suitable dataset</a:t>
+                        <a:t>Finding a suitable dataset</a:t>
                       </a:r>
                       <a:endParaRPr sz="1600" dirty="0"/>
                     </a:p>
@@ -7972,23 +8390,14 @@
                       <a:pPr algn="l"/>
                       <a:r>
                         <a:rPr lang="en-AU" sz="1600" dirty="0" smtClean="0"/>
-                        <a:t>Lee: </a:t>
+                        <a:t>Lee: Basic</a:t>
                       </a:r>
-                      <a:r>
-                        <a:rPr lang="en-AU" sz="1600" dirty="0" smtClean="0"/>
-                        <a:t>None</a:t>
-                      </a:r>
-                      <a:endParaRPr lang="en-AU" sz="1600" dirty="0" smtClean="0"/>
                     </a:p>
                     <a:p>
                       <a:pPr algn="l"/>
                       <a:r>
                         <a:rPr lang="en-AU" sz="1600" dirty="0" smtClean="0"/>
-                        <a:t>Phil</a:t>
-                      </a:r>
-                      <a:r>
-                        <a:rPr lang="en-AU" sz="1600" dirty="0" smtClean="0"/>
-                        <a:t>: Competent</a:t>
+                        <a:t>Phil: Competent</a:t>
                       </a:r>
                       <a:endParaRPr sz="1600" dirty="0"/>
                     </a:p>
@@ -8000,7 +8409,17 @@
                     <a:bodyPr/>
                     <a:lstStyle/>
                     <a:p>
-                      <a:pPr algn="ctr"/>
+                      <a:pPr algn="l"/>
+                      <a:r>
+                        <a:rPr lang="en-AU" sz="1600" dirty="0" smtClean="0">
+                          <a:hlinkClick r:id="rId3"/>
+                        </a:rPr>
+                        <a:t>https://www.kaggle.com/datasets</a:t>
+                      </a:r>
+                      <a:r>
+                        <a:rPr lang="en-AU" sz="1600" baseline="0" dirty="0" smtClean="0"/>
+                        <a:t> </a:t>
+                      </a:r>
                       <a:endParaRPr lang="en-AU" sz="1600" dirty="0" smtClean="0"/>
                     </a:p>
                   </a:txBody>
@@ -8039,18 +8458,14 @@
                       </a:r>
                       <a:r>
                         <a:rPr lang="en-AU" sz="1600" baseline="0" dirty="0" smtClean="0"/>
-                        <a:t> </a:t>
-                      </a:r>
-                      <a:r>
-                        <a:rPr lang="en-AU" sz="1600" baseline="0" dirty="0" smtClean="0"/>
-                        <a:t>None</a:t>
+                        <a:t> None</a:t>
                       </a:r>
                     </a:p>
                     <a:p>
                       <a:pPr algn="l"/>
                       <a:r>
                         <a:rPr lang="en-AU" sz="1600" baseline="0" dirty="0" smtClean="0"/>
-                        <a:t>Phil: Basic???</a:t>
+                        <a:t>Phil: Basic</a:t>
                       </a:r>
                       <a:endParaRPr sz="1600" dirty="0"/>
                     </a:p>
@@ -8062,8 +8477,32 @@
                     <a:bodyPr/>
                     <a:lstStyle/>
                     <a:p>
-                      <a:pPr algn="ctr"/>
-                      <a:endParaRPr sz="1100" dirty="0"/>
+                      <a:pPr algn="l"/>
+                      <a:r>
+                        <a:rPr lang="en-AU" sz="1100" baseline="0" dirty="0" smtClean="0"/>
+                        <a:t>Genetic Algorithm Theory – Lecture notes from Johannes Kepler University </a:t>
+                      </a:r>
+                      <a:endParaRPr lang="en-AU" sz="1100" dirty="0" smtClean="0">
+                        <a:hlinkClick r:id="rId4"/>
+                      </a:endParaRPr>
+                    </a:p>
+                    <a:p>
+                      <a:pPr algn="l"/>
+                      <a:r>
+                        <a:rPr lang="en-AU" sz="1100" dirty="0" smtClean="0">
+                          <a:hlinkClick r:id="rId4"/>
+                        </a:rPr>
+                        <a:t>http://www.flll.jku.at/div/teaching/Ga/GA-Notes.pdf</a:t>
+                      </a:r>
+                      <a:r>
+                        <a:rPr lang="en-AU" sz="1100" dirty="0" smtClean="0"/>
+                        <a:t> </a:t>
+                      </a:r>
+                      <a:r>
+                        <a:rPr lang="en-AU" sz="1100" baseline="30000" dirty="0" smtClean="0"/>
+                        <a:t>[2]</a:t>
+                      </a:r>
+                      <a:endParaRPr sz="1100" baseline="30000" dirty="0"/>
                     </a:p>
                   </a:txBody>
                   <a:tcPr anchor="ctr"/>
@@ -8119,8 +8558,33 @@
                     <a:bodyPr/>
                     <a:lstStyle/>
                     <a:p>
-                      <a:pPr algn="ctr"/>
-                      <a:endParaRPr sz="1100" dirty="0"/>
+                      <a:pPr algn="l"/>
+                      <a:r>
+                        <a:rPr lang="en-AU" sz="1100" dirty="0" smtClean="0"/>
+                        <a:t>Genetic Algorithms tutorial</a:t>
+                      </a:r>
+                      <a:r>
+                        <a:rPr lang="en-AU" sz="1100" baseline="0" dirty="0" smtClean="0"/>
+                        <a:t> in Python</a:t>
+                      </a:r>
+                    </a:p>
+                    <a:p>
+                      <a:pPr algn="l"/>
+                      <a:r>
+                        <a:rPr lang="en-AU" sz="1100" dirty="0" smtClean="0">
+                          <a:hlinkClick r:id="rId5"/>
+                        </a:rPr>
+                        <a:t>https://blog.sicara.com/getting-started-genetic-algorithms-python-tutorial-81ffa1dd72f9</a:t>
+                      </a:r>
+                      <a:r>
+                        <a:rPr lang="en-AU" sz="1100" dirty="0" smtClean="0"/>
+                        <a:t> </a:t>
+                      </a:r>
+                      <a:r>
+                        <a:rPr lang="en-AU" sz="1100" baseline="30000" dirty="0" smtClean="0"/>
+                        <a:t>[3]</a:t>
+                      </a:r>
+                      <a:endParaRPr sz="1100" baseline="30000" dirty="0"/>
                     </a:p>
                   </a:txBody>
                   <a:tcPr anchor="ctr"/>
@@ -8172,8 +8636,33 @@
                     <a:bodyPr/>
                     <a:lstStyle/>
                     <a:p>
-                      <a:pPr algn="ctr"/>
-                      <a:endParaRPr sz="1600" dirty="0"/>
+                      <a:pPr algn="l"/>
+                      <a:r>
+                        <a:rPr lang="en-AU" sz="1200" dirty="0" smtClean="0"/>
+                        <a:t>Data cleaning</a:t>
+                      </a:r>
+                      <a:r>
+                        <a:rPr lang="en-AU" sz="1200" baseline="0" dirty="0" smtClean="0"/>
+                        <a:t> 101</a:t>
+                      </a:r>
+                    </a:p>
+                    <a:p>
+                      <a:pPr algn="l"/>
+                      <a:r>
+                        <a:rPr lang="en-AU" sz="1200" dirty="0" smtClean="0">
+                          <a:hlinkClick r:id="rId6"/>
+                        </a:rPr>
+                        <a:t>https://towardsdatascience.com/data-cleaning-101-948d22a92e4</a:t>
+                      </a:r>
+                      <a:r>
+                        <a:rPr lang="en-AU" sz="1200" dirty="0" smtClean="0"/>
+                        <a:t> </a:t>
+                      </a:r>
+                      <a:r>
+                        <a:rPr lang="en-AU" sz="1200" baseline="30000" dirty="0" smtClean="0"/>
+                        <a:t>[4]</a:t>
+                      </a:r>
+                      <a:endParaRPr sz="1200" baseline="30000" dirty="0"/>
                     </a:p>
                   </a:txBody>
                   <a:tcPr anchor="ctr"/>
@@ -8270,26 +8759,115 @@
           </a:xfrm>
         </p:spPr>
         <p:txBody>
-          <a:bodyPr/>
+          <a:bodyPr>
+            <a:normAutofit lnSpcReduction="10000"/>
+          </a:bodyPr>
           <a:lstStyle/>
           <a:p>
+            <a:pPr marL="0" indent="0">
+              <a:buNone/>
+            </a:pPr>
+            <a:r>
+              <a:rPr lang="en-AU" sz="2400" b="1" dirty="0" smtClean="0"/>
+              <a:t>Optimisation Problem</a:t>
+            </a:r>
+          </a:p>
+          <a:p>
             <a:r>
               <a:rPr lang="en-AU" dirty="0" smtClean="0"/>
-              <a:t>Find a good dataset?</a:t>
-            </a:r>
-          </a:p>
-          <a:p>
+              <a:t> </a:t>
+            </a:r>
+            <a:r>
+              <a:rPr lang="en-AU" dirty="0"/>
+              <a:t>Find a problem suitable for </a:t>
+            </a:r>
             <a:r>
               <a:rPr lang="en-AU" dirty="0" smtClean="0"/>
-              <a:t>Choose a good model?</a:t>
+              <a:t>optimisation</a:t>
             </a:r>
           </a:p>
           <a:p>
             <a:r>
               <a:rPr lang="en-AU" dirty="0" smtClean="0"/>
-              <a:t>Clean data?</a:t>
-            </a:r>
-            <a:endParaRPr lang="en-AU" dirty="0"/>
+              <a:t> </a:t>
+            </a:r>
+            <a:r>
+              <a:rPr lang="en-AU" dirty="0"/>
+              <a:t>Find a </a:t>
+            </a:r>
+            <a:r>
+              <a:rPr lang="en-AU" dirty="0" smtClean="0"/>
+              <a:t>dataset</a:t>
+            </a:r>
+          </a:p>
+          <a:p>
+            <a:r>
+              <a:rPr lang="en-AU" dirty="0" smtClean="0"/>
+              <a:t> </a:t>
+            </a:r>
+            <a:r>
+              <a:rPr lang="en-AU" dirty="0"/>
+              <a:t>Performance tracking and </a:t>
+            </a:r>
+            <a:r>
+              <a:rPr lang="en-AU" dirty="0" smtClean="0"/>
+              <a:t>measurement</a:t>
+            </a:r>
+          </a:p>
+          <a:p>
+            <a:pPr marL="0" indent="0">
+              <a:buNone/>
+            </a:pPr>
+            <a:r>
+              <a:rPr lang="en-AU" sz="2400" b="1" dirty="0" smtClean="0"/>
+              <a:t>Genetic </a:t>
+            </a:r>
+            <a:r>
+              <a:rPr lang="en-AU" sz="2400" b="1" dirty="0"/>
+              <a:t>Algorithm </a:t>
+            </a:r>
+            <a:r>
+              <a:rPr lang="en-AU" sz="2400" b="1" dirty="0" smtClean="0"/>
+              <a:t>Challenges</a:t>
+            </a:r>
+          </a:p>
+          <a:p>
+            <a:r>
+              <a:rPr lang="en-AU" dirty="0" smtClean="0"/>
+              <a:t> </a:t>
+            </a:r>
+            <a:r>
+              <a:rPr lang="en-AU" dirty="0"/>
+              <a:t>Representation of the </a:t>
+            </a:r>
+            <a:r>
+              <a:rPr lang="en-AU" dirty="0" smtClean="0"/>
+              <a:t>dataset</a:t>
+            </a:r>
+          </a:p>
+          <a:p>
+            <a:r>
+              <a:rPr lang="en-AU" dirty="0" smtClean="0"/>
+              <a:t> </a:t>
+            </a:r>
+            <a:r>
+              <a:rPr lang="en-AU" dirty="0"/>
+              <a:t>Genetic Algorithm design and </a:t>
+            </a:r>
+            <a:r>
+              <a:rPr lang="en-AU" dirty="0" smtClean="0"/>
+              <a:t>implementation</a:t>
+            </a:r>
+          </a:p>
+          <a:p>
+            <a:r>
+              <a:rPr lang="en-AU" dirty="0" smtClean="0"/>
+              <a:t> </a:t>
+            </a:r>
+            <a:r>
+              <a:rPr lang="en-AU" dirty="0"/>
+              <a:t>Hyperparameter settings</a:t>
+            </a:r>
           </a:p>
         </p:txBody>
       </p:sp>
@@ -8351,42 +8929,93 @@
           <a:lstStyle/>
           <a:p>
             <a:r>
-              <a:rPr lang="en-US" dirty="0" smtClean="0"/>
+              <a:rPr lang="en-AU" dirty="0" smtClean="0"/>
               <a:t>Our Solution</a:t>
             </a:r>
-            <a:endParaRPr lang="en-US" dirty="0"/>
+            <a:endParaRPr lang="en-AU" dirty="0"/>
           </a:p>
         </p:txBody>
       </p:sp>
-      <p:graphicFrame>
-        <p:nvGraphicFramePr>
-          <p:cNvPr id="8" name="Content Placeholder 2" descr="Trapezoid list showing 4 groups arranged from left to right with task descriptions under each group"/>
-          <p:cNvGraphicFramePr>
-            <a:graphicFrameLocks noGrp="1"/>
-          </p:cNvGraphicFramePr>
+      <p:sp>
+        <p:nvSpPr>
+          <p:cNvPr id="4" name="Content Placeholder 3"/>
+          <p:cNvSpPr>
+            <a:spLocks noGrp="1"/>
+          </p:cNvSpPr>
           <p:nvPr>
-            <p:ph idx="1"/>
-            <p:extLst>
-              <p:ext uri="{D42A27DB-BD31-4B8C-83A1-F6EECF244321}">
-                <p14:modId xmlns:p14="http://schemas.microsoft.com/office/powerpoint/2010/main" val="1707492323"/>
-              </p:ext>
-            </p:extLst>
+            <p:ph sz="half" idx="2"/>
           </p:nvPr>
-        </p:nvGraphicFramePr>
-        <p:xfrm>
-          <a:off x="1279525" y="2190750"/>
-          <a:ext cx="9629775" cy="3986213"/>
-        </p:xfrm>
-        <a:graphic>
-          <a:graphicData uri="http://schemas.openxmlformats.org/drawingml/2006/diagram">
-            <dgm:relIds xmlns:dgm="http://schemas.openxmlformats.org/drawingml/2006/diagram" xmlns:r="http://schemas.openxmlformats.org/officeDocument/2006/relationships" r:dm="rId2" r:lo="rId3" r:qs="rId4" r:cs="rId5"/>
-          </a:graphicData>
-        </a:graphic>
-      </p:graphicFrame>
+        </p:nvSpPr>
+        <p:spPr>
+          <a:xfrm>
+            <a:off x="1280160" y="2095500"/>
+            <a:ext cx="10149840" cy="4486275"/>
+          </a:xfrm>
+        </p:spPr>
+        <p:txBody>
+          <a:bodyPr>
+            <a:normAutofit/>
+          </a:bodyPr>
+          <a:lstStyle/>
+          <a:p>
+            <a:r>
+              <a:rPr lang="en-AU" sz="2800" dirty="0" smtClean="0"/>
+              <a:t>Genetic </a:t>
+            </a:r>
+            <a:r>
+              <a:rPr lang="en-AU" sz="2800" dirty="0"/>
+              <a:t>Algorithms are a class of evolutionary algorithms used for solving </a:t>
+            </a:r>
+            <a:r>
+              <a:rPr lang="en-AU" sz="2800" dirty="0" smtClean="0"/>
+              <a:t>optimisation problems.</a:t>
+            </a:r>
+          </a:p>
+          <a:p>
+            <a:endParaRPr lang="en-AU" sz="2800" dirty="0" smtClean="0"/>
+          </a:p>
+          <a:p>
+            <a:r>
+              <a:rPr lang="en-AU" sz="2800" dirty="0" smtClean="0"/>
+              <a:t>They </a:t>
+            </a:r>
+            <a:r>
+              <a:rPr lang="en-AU" sz="2800" dirty="0"/>
+              <a:t>require data to be encoded with particular </a:t>
+            </a:r>
+            <a:r>
+              <a:rPr lang="en-AU" sz="2800" dirty="0" smtClean="0"/>
+              <a:t>structure.</a:t>
+            </a:r>
+          </a:p>
+          <a:p>
+            <a:endParaRPr lang="en-AU" sz="2800" dirty="0" smtClean="0"/>
+          </a:p>
+          <a:p>
+            <a:r>
+              <a:rPr lang="en-AU" sz="2800" dirty="0" smtClean="0"/>
+              <a:t>We </a:t>
+            </a:r>
+            <a:r>
+              <a:rPr lang="en-AU" sz="2800" dirty="0"/>
+              <a:t>apply a Genetic Algorithm to optimise the weights in a linear equation for predicting medical insurance costs using a dataset from </a:t>
+            </a:r>
+            <a:r>
+              <a:rPr lang="en-AU" sz="2800" dirty="0" err="1" smtClean="0"/>
+              <a:t>Kaggle</a:t>
+            </a:r>
+            <a:r>
+              <a:rPr lang="en-AU" sz="2800" dirty="0" smtClean="0"/>
+              <a:t>.</a:t>
+            </a:r>
+            <a:endParaRPr lang="en-AU" sz="2800" dirty="0"/>
+          </a:p>
+        </p:txBody>
+      </p:sp>
     </p:spTree>
     <p:extLst>
       <p:ext uri="{BB962C8B-B14F-4D97-AF65-F5344CB8AC3E}">
-        <p14:creationId xmlns:p14="http://schemas.microsoft.com/office/powerpoint/2010/main" val="2249699226"/>
+        <p14:creationId xmlns:p14="http://schemas.microsoft.com/office/powerpoint/2010/main" val="2322833673"/>
       </p:ext>
     </p:extLst>
   </p:cSld>
@@ -8441,60 +9070,42 @@
           <a:lstStyle/>
           <a:p>
             <a:r>
-              <a:rPr lang="en-AU" dirty="0" smtClean="0"/>
+              <a:rPr lang="en-US" dirty="0" smtClean="0"/>
               <a:t>Our Solution</a:t>
             </a:r>
-            <a:endParaRPr lang="en-AU" dirty="0"/>
+            <a:endParaRPr lang="en-US" dirty="0"/>
           </a:p>
         </p:txBody>
       </p:sp>
-      <p:sp>
-        <p:nvSpPr>
-          <p:cNvPr id="3" name="Text Placeholder 2"/>
-          <p:cNvSpPr>
-            <a:spLocks noGrp="1"/>
-          </p:cNvSpPr>
+      <p:graphicFrame>
+        <p:nvGraphicFramePr>
+          <p:cNvPr id="8" name="Content Placeholder 2" descr="Trapezoid list showing 4 groups arranged from left to right with task descriptions under each group"/>
+          <p:cNvGraphicFramePr>
+            <a:graphicFrameLocks noGrp="1"/>
+          </p:cNvGraphicFramePr>
           <p:nvPr>
-            <p:ph type="body" idx="1"/>
+            <p:ph idx="1"/>
+            <p:extLst>
+              <p:ext uri="{D42A27DB-BD31-4B8C-83A1-F6EECF244321}">
+                <p14:modId xmlns:p14="http://schemas.microsoft.com/office/powerpoint/2010/main" val="396251866"/>
+              </p:ext>
+            </p:extLst>
           </p:nvPr>
-        </p:nvSpPr>
-        <p:spPr/>
-        <p:txBody>
-          <a:bodyPr/>
-          <a:lstStyle/>
-          <a:p>
-            <a:endParaRPr lang="en-AU"/>
-          </a:p>
-        </p:txBody>
-      </p:sp>
-      <p:sp>
-        <p:nvSpPr>
-          <p:cNvPr id="4" name="Content Placeholder 3"/>
-          <p:cNvSpPr>
-            <a:spLocks noGrp="1"/>
-          </p:cNvSpPr>
-          <p:nvPr>
-            <p:ph sz="half" idx="2"/>
-          </p:nvPr>
-        </p:nvSpPr>
-        <p:spPr>
-          <a:xfrm>
-            <a:off x="1280160" y="2743194"/>
-            <a:ext cx="10149840" cy="3433769"/>
-          </a:xfrm>
-        </p:spPr>
-        <p:txBody>
-          <a:bodyPr/>
-          <a:lstStyle/>
-          <a:p>
-            <a:endParaRPr lang="en-AU"/>
-          </a:p>
-        </p:txBody>
-      </p:sp>
+        </p:nvGraphicFramePr>
+        <p:xfrm>
+          <a:off x="1279525" y="2190750"/>
+          <a:ext cx="9629775" cy="3986213"/>
+        </p:xfrm>
+        <a:graphic>
+          <a:graphicData uri="http://schemas.openxmlformats.org/drawingml/2006/diagram">
+            <dgm:relIds xmlns:dgm="http://schemas.openxmlformats.org/drawingml/2006/diagram" xmlns:r="http://schemas.openxmlformats.org/officeDocument/2006/relationships" r:dm="rId2" r:lo="rId3" r:qs="rId4" r:cs="rId5"/>
+          </a:graphicData>
+        </a:graphic>
+      </p:graphicFrame>
     </p:spTree>
     <p:extLst>
       <p:ext uri="{BB962C8B-B14F-4D97-AF65-F5344CB8AC3E}">
-        <p14:creationId xmlns:p14="http://schemas.microsoft.com/office/powerpoint/2010/main" val="2322833673"/>
+        <p14:creationId xmlns:p14="http://schemas.microsoft.com/office/powerpoint/2010/main" val="2249699226"/>
       </p:ext>
     </p:extLst>
   </p:cSld>
@@ -8578,6 +9189,13 @@
       </p:transition>
     </mc:Fallback>
   </mc:AlternateContent>
+  <p:timing>
+    <p:tnLst>
+      <p:par>
+        <p:cTn id="1" dur="indefinite" restart="never" nodeType="tmRoot"/>
+      </p:par>
+    </p:tnLst>
+  </p:timing>
 </p:sld>
 </file>
 
@@ -8615,12 +9233,36 @@
           <a:p>
             <a:r>
               <a:rPr lang="en-US" dirty="0" smtClean="0"/>
-              <a:t>Code snippets</a:t>
+              <a:t>Code snippets - 1</a:t>
             </a:r>
             <a:endParaRPr lang="en-US" dirty="0"/>
           </a:p>
         </p:txBody>
       </p:sp>
+      <p:pic>
+        <p:nvPicPr>
+          <p:cNvPr id="3" name="Picture 2"/>
+          <p:cNvPicPr>
+            <a:picLocks noChangeAspect="1"/>
+          </p:cNvPicPr>
+          <p:nvPr/>
+        </p:nvPicPr>
+        <p:blipFill>
+          <a:blip r:embed="rId2"/>
+          <a:stretch>
+            <a:fillRect/>
+          </a:stretch>
+        </p:blipFill>
+        <p:spPr>
+          <a:xfrm>
+            <a:off x="401112" y="2847976"/>
+            <a:ext cx="11386727" cy="2162174"/>
+          </a:xfrm>
+          <a:prstGeom prst="rect">
+            <a:avLst/>
+          </a:prstGeom>
+        </p:spPr>
+      </p:pic>
     </p:spTree>
     <p:extLst>
       <p:ext uri="{BB962C8B-B14F-4D97-AF65-F5344CB8AC3E}">
@@ -8679,351 +9321,41 @@
           <a:lstStyle/>
           <a:p>
             <a:r>
-              <a:rPr lang="en-AU" dirty="0" smtClean="0"/>
-              <a:t>Limitations and constraints</a:t>
-            </a:r>
-            <a:endParaRPr lang="en-AU" dirty="0"/>
+              <a:rPr lang="en-US" dirty="0" smtClean="0"/>
+              <a:t>Code snippets – 2</a:t>
+            </a:r>
+            <a:endParaRPr lang="en-US" dirty="0"/>
           </a:p>
         </p:txBody>
       </p:sp>
-      <p:sp>
-        <p:nvSpPr>
-          <p:cNvPr id="5" name="Rectangle 2"/>
-          <p:cNvSpPr>
-            <a:spLocks noChangeArrowheads="1"/>
-          </p:cNvSpPr>
+      <p:pic>
+        <p:nvPicPr>
+          <p:cNvPr id="3" name="Picture 2"/>
+          <p:cNvPicPr>
+            <a:picLocks noChangeAspect="1"/>
+          </p:cNvPicPr>
           <p:nvPr/>
-        </p:nvSpPr>
-        <p:spPr bwMode="auto">
+        </p:nvPicPr>
+        <p:blipFill>
+          <a:blip r:embed="rId2"/>
+          <a:stretch>
+            <a:fillRect/>
+          </a:stretch>
+        </p:blipFill>
+        <p:spPr>
           <a:xfrm>
-            <a:off x="152400" y="2892505"/>
-            <a:ext cx="13031709" cy="2215991"/>
+            <a:off x="379476" y="2495550"/>
+            <a:ext cx="11430000" cy="3105150"/>
           </a:xfrm>
           <a:prstGeom prst="rect">
             <a:avLst/>
           </a:prstGeom>
-          <a:noFill/>
-          <a:ln>
-            <a:noFill/>
-          </a:ln>
-          <a:effectLst/>
         </p:spPr>
-        <p:txBody>
-          <a:bodyPr vert="horz" wrap="none" lIns="0" tIns="0" rIns="0" bIns="0" numCol="1" anchor="ctr" anchorCtr="0" compatLnSpc="1">
-            <a:prstTxWarp prst="textNoShape">
-              <a:avLst/>
-            </a:prstTxWarp>
-            <a:spAutoFit/>
-          </a:bodyPr>
-          <a:lstStyle>
-            <a:lvl1pPr eaLnBrk="0" fontAlgn="base" hangingPunct="0">
-              <a:spcBef>
-                <a:spcPct val="0"/>
-              </a:spcBef>
-              <a:spcAft>
-                <a:spcPct val="0"/>
-              </a:spcAft>
-              <a:defRPr>
-                <a:solidFill>
-                  <a:schemeClr val="tx1"/>
-                </a:solidFill>
-                <a:latin typeface="Arial" panose="020B0604020202020204" pitchFamily="34" charset="0"/>
-              </a:defRPr>
-            </a:lvl1pPr>
-            <a:lvl2pPr eaLnBrk="0" fontAlgn="base" hangingPunct="0">
-              <a:spcBef>
-                <a:spcPct val="0"/>
-              </a:spcBef>
-              <a:spcAft>
-                <a:spcPct val="0"/>
-              </a:spcAft>
-              <a:defRPr>
-                <a:solidFill>
-                  <a:schemeClr val="tx1"/>
-                </a:solidFill>
-                <a:latin typeface="Arial" panose="020B0604020202020204" pitchFamily="34" charset="0"/>
-              </a:defRPr>
-            </a:lvl2pPr>
-            <a:lvl3pPr eaLnBrk="0" fontAlgn="base" hangingPunct="0">
-              <a:spcBef>
-                <a:spcPct val="0"/>
-              </a:spcBef>
-              <a:spcAft>
-                <a:spcPct val="0"/>
-              </a:spcAft>
-              <a:defRPr>
-                <a:solidFill>
-                  <a:schemeClr val="tx1"/>
-                </a:solidFill>
-                <a:latin typeface="Arial" panose="020B0604020202020204" pitchFamily="34" charset="0"/>
-              </a:defRPr>
-            </a:lvl3pPr>
-            <a:lvl4pPr eaLnBrk="0" fontAlgn="base" hangingPunct="0">
-              <a:spcBef>
-                <a:spcPct val="0"/>
-              </a:spcBef>
-              <a:spcAft>
-                <a:spcPct val="0"/>
-              </a:spcAft>
-              <a:defRPr>
-                <a:solidFill>
-                  <a:schemeClr val="tx1"/>
-                </a:solidFill>
-                <a:latin typeface="Arial" panose="020B0604020202020204" pitchFamily="34" charset="0"/>
-              </a:defRPr>
-            </a:lvl4pPr>
-            <a:lvl5pPr eaLnBrk="0" fontAlgn="base" hangingPunct="0">
-              <a:spcBef>
-                <a:spcPct val="0"/>
-              </a:spcBef>
-              <a:spcAft>
-                <a:spcPct val="0"/>
-              </a:spcAft>
-              <a:defRPr>
-                <a:solidFill>
-                  <a:schemeClr val="tx1"/>
-                </a:solidFill>
-                <a:latin typeface="Arial" panose="020B0604020202020204" pitchFamily="34" charset="0"/>
-              </a:defRPr>
-            </a:lvl5pPr>
-            <a:lvl6pPr eaLnBrk="0" fontAlgn="base" hangingPunct="0">
-              <a:spcBef>
-                <a:spcPct val="0"/>
-              </a:spcBef>
-              <a:spcAft>
-                <a:spcPct val="0"/>
-              </a:spcAft>
-              <a:defRPr>
-                <a:solidFill>
-                  <a:schemeClr val="tx1"/>
-                </a:solidFill>
-                <a:latin typeface="Arial" panose="020B0604020202020204" pitchFamily="34" charset="0"/>
-              </a:defRPr>
-            </a:lvl6pPr>
-            <a:lvl7pPr eaLnBrk="0" fontAlgn="base" hangingPunct="0">
-              <a:spcBef>
-                <a:spcPct val="0"/>
-              </a:spcBef>
-              <a:spcAft>
-                <a:spcPct val="0"/>
-              </a:spcAft>
-              <a:defRPr>
-                <a:solidFill>
-                  <a:schemeClr val="tx1"/>
-                </a:solidFill>
-                <a:latin typeface="Arial" panose="020B0604020202020204" pitchFamily="34" charset="0"/>
-              </a:defRPr>
-            </a:lvl7pPr>
-            <a:lvl8pPr eaLnBrk="0" fontAlgn="base" hangingPunct="0">
-              <a:spcBef>
-                <a:spcPct val="0"/>
-              </a:spcBef>
-              <a:spcAft>
-                <a:spcPct val="0"/>
-              </a:spcAft>
-              <a:defRPr>
-                <a:solidFill>
-                  <a:schemeClr val="tx1"/>
-                </a:solidFill>
-                <a:latin typeface="Arial" panose="020B0604020202020204" pitchFamily="34" charset="0"/>
-              </a:defRPr>
-            </a:lvl8pPr>
-            <a:lvl9pPr eaLnBrk="0" fontAlgn="base" hangingPunct="0">
-              <a:spcBef>
-                <a:spcPct val="0"/>
-              </a:spcBef>
-              <a:spcAft>
-                <a:spcPct val="0"/>
-              </a:spcAft>
-              <a:defRPr>
-                <a:solidFill>
-                  <a:schemeClr val="tx1"/>
-                </a:solidFill>
-                <a:latin typeface="Arial" panose="020B0604020202020204" pitchFamily="34" charset="0"/>
-              </a:defRPr>
-            </a:lvl9pPr>
-          </a:lstStyle>
-          <a:p>
-            <a:r>
-              <a:rPr lang="en-AU" sz="1200" dirty="0"/>
-              <a:t>A number of possible explanations exist to explain the discrepancy between effective convergence towards the global minimum and the modest accuracy of predictions.</a:t>
-            </a:r>
-          </a:p>
-          <a:p>
-            <a:r>
-              <a:rPr lang="en-AU" sz="1200" dirty="0"/>
-              <a:t>First, a linear algorithm may not be a good fit as a model for predicting insurance costs from this data. </a:t>
-            </a:r>
-            <a:endParaRPr lang="en-AU" sz="1200" dirty="0" smtClean="0"/>
-          </a:p>
-          <a:p>
-            <a:r>
-              <a:rPr lang="en-AU" sz="1200" dirty="0" smtClean="0"/>
-              <a:t>The </a:t>
-            </a:r>
-            <a:r>
-              <a:rPr lang="en-AU" sz="1200" dirty="0"/>
-              <a:t>relationship between the features in the dataset and the labels may be more complex. </a:t>
-            </a:r>
-            <a:endParaRPr lang="en-AU" sz="1200" dirty="0" smtClean="0"/>
-          </a:p>
-          <a:p>
-            <a:r>
-              <a:rPr lang="en-AU" sz="1200" dirty="0" smtClean="0"/>
-              <a:t>Second</a:t>
-            </a:r>
-            <a:r>
-              <a:rPr lang="en-AU" sz="1200" dirty="0"/>
-              <a:t>, the relatively small dataset may provide insufficient information to generate an accurate model. </a:t>
-            </a:r>
-            <a:endParaRPr lang="en-AU" sz="1200" dirty="0" smtClean="0"/>
-          </a:p>
-          <a:p>
-            <a:r>
-              <a:rPr lang="en-AU" sz="1200" dirty="0" smtClean="0"/>
-              <a:t>Third</a:t>
-            </a:r>
-            <a:r>
-              <a:rPr lang="en-AU" sz="1200" dirty="0"/>
-              <a:t>, the existing features might not be used in a sufficiently complex way to generate a good model (for example, feature crosses or higher order features are not used). </a:t>
-            </a:r>
-            <a:endParaRPr lang="en-AU" sz="1200" dirty="0" smtClean="0"/>
-          </a:p>
-          <a:p>
-            <a:r>
-              <a:rPr lang="en-AU" sz="1200" dirty="0" smtClean="0"/>
-              <a:t>Additional </a:t>
-            </a:r>
-            <a:r>
-              <a:rPr lang="en-AU" sz="1200" dirty="0"/>
-              <a:t>feature engineering might address the problem if this third issue is at play, but the purpose of this assignment was to develop an effective genetic algorithm for optimisation, </a:t>
-            </a:r>
-            <a:endParaRPr lang="en-AU" sz="1200" dirty="0" smtClean="0"/>
-          </a:p>
-          <a:p>
-            <a:r>
-              <a:rPr lang="en-AU" sz="1200" dirty="0" smtClean="0"/>
-              <a:t>not </a:t>
-            </a:r>
-            <a:r>
-              <a:rPr lang="en-AU" sz="1200" dirty="0"/>
-              <a:t>to solve the problem of predicting medical insurance costs. </a:t>
-            </a:r>
-            <a:r>
-              <a:rPr lang="en-AU" sz="1200" dirty="0"/>
-              <a:t>We believe successful convergence demonstrates this.</a:t>
-            </a:r>
-          </a:p>
-          <a:p>
-            <a:pPr marL="0" marR="0" lvl="0" indent="0" algn="l" defTabSz="914400" rtl="0" eaLnBrk="0" fontAlgn="base" latinLnBrk="0" hangingPunct="0">
-              <a:lnSpc>
-                <a:spcPct val="100000"/>
-              </a:lnSpc>
-              <a:spcBef>
-                <a:spcPct val="0"/>
-              </a:spcBef>
-              <a:spcAft>
-                <a:spcPct val="0"/>
-              </a:spcAft>
-              <a:buClrTx/>
-              <a:buSzTx/>
-              <a:buFontTx/>
-              <a:buNone/>
-              <a:tabLst/>
-            </a:pPr>
-            <a:endParaRPr lang="en-US" altLang="en-US" sz="1200" dirty="0"/>
-          </a:p>
-          <a:p>
-            <a:pPr marL="0" marR="0" lvl="0" indent="0" algn="l" defTabSz="914400" rtl="0" eaLnBrk="0" fontAlgn="base" latinLnBrk="0" hangingPunct="0">
-              <a:lnSpc>
-                <a:spcPct val="100000"/>
-              </a:lnSpc>
-              <a:spcBef>
-                <a:spcPct val="0"/>
-              </a:spcBef>
-              <a:spcAft>
-                <a:spcPct val="0"/>
-              </a:spcAft>
-              <a:buClrTx/>
-              <a:buSzTx/>
-              <a:buFontTx/>
-              <a:buNone/>
-              <a:tabLst/>
-            </a:pPr>
-            <a:endParaRPr lang="en-US" altLang="en-US" sz="1200" dirty="0"/>
-          </a:p>
-          <a:p>
-            <a:pPr marL="0" marR="0" lvl="0" indent="0" algn="l" defTabSz="914400" rtl="0" eaLnBrk="0" fontAlgn="base" latinLnBrk="0" hangingPunct="0">
-              <a:lnSpc>
-                <a:spcPct val="100000"/>
-              </a:lnSpc>
-              <a:spcBef>
-                <a:spcPct val="0"/>
-              </a:spcBef>
-              <a:spcAft>
-                <a:spcPct val="0"/>
-              </a:spcAft>
-              <a:buClrTx/>
-              <a:buSzTx/>
-              <a:buFontTx/>
-              <a:buNone/>
-              <a:tabLst/>
-            </a:pPr>
-            <a:r>
-              <a:rPr lang="en-US" altLang="en-US" sz="1200" dirty="0"/>
-              <a:t>Notes</a:t>
-            </a:r>
-          </a:p>
-          <a:p>
-            <a:pPr marL="0" marR="0" lvl="0" indent="0" algn="l" defTabSz="914400" rtl="0" eaLnBrk="0" fontAlgn="base" latinLnBrk="0" hangingPunct="0">
-              <a:lnSpc>
-                <a:spcPct val="100000"/>
-              </a:lnSpc>
-              <a:spcBef>
-                <a:spcPct val="0"/>
-              </a:spcBef>
-              <a:spcAft>
-                <a:spcPct val="0"/>
-              </a:spcAft>
-              <a:buClrTx/>
-              <a:buSzTx/>
-              <a:buFontTx/>
-              <a:buNone/>
-              <a:tabLst/>
-            </a:pPr>
-            <a:r>
-              <a:rPr lang="en-US" altLang="en-US" sz="1200" dirty="0"/>
-              <a:t>Random seeding of initial states can make a fairly significant difference to training results, but this differences erodes over larger generation and population sizes to become relatively negligible.</a:t>
-            </a:r>
-          </a:p>
-          <a:p>
-            <a:pPr marL="0" marR="0" lvl="0" indent="0" algn="l" defTabSz="914400" rtl="0" eaLnBrk="0" fontAlgn="base" latinLnBrk="0" hangingPunct="0">
-              <a:lnSpc>
-                <a:spcPct val="100000"/>
-              </a:lnSpc>
-              <a:spcBef>
-                <a:spcPct val="0"/>
-              </a:spcBef>
-              <a:spcAft>
-                <a:spcPct val="0"/>
-              </a:spcAft>
-              <a:buClrTx/>
-              <a:buSzTx/>
-              <a:buFontTx/>
-              <a:buNone/>
-              <a:tabLst/>
-            </a:pPr>
-            <a:r>
-              <a:rPr lang="en-US" altLang="en-US" sz="1200" dirty="0"/>
-              <a:t>Debug options are available in the code for extended logging. They're implemented pretty naively, just uncomment the lines ending in a comment # debug.</a:t>
-            </a:r>
-          </a:p>
-        </p:txBody>
-      </p:sp>
+      </p:pic>
     </p:spTree>
     <p:extLst>
       <p:ext uri="{BB962C8B-B14F-4D97-AF65-F5344CB8AC3E}">
-        <p14:creationId xmlns:p14="http://schemas.microsoft.com/office/powerpoint/2010/main" val="1378578984"/>
+        <p14:creationId xmlns:p14="http://schemas.microsoft.com/office/powerpoint/2010/main" val="1302036535"/>
       </p:ext>
     </p:extLst>
   </p:cSld>

</xml_diff>